<commit_message>
Finished lecture 3.  Added next assignment
</commit_message>
<xml_diff>
--- a/Lectures/Lecture 3 - 20170906 Logic Laws.pptx
+++ b/Lectures/Lecture 3 - 20170906 Logic Laws.pptx
@@ -16,6 +16,9 @@
     <p:sldId id="262" r:id="rId10"/>
     <p:sldId id="264" r:id="rId11"/>
     <p:sldId id="265" r:id="rId12"/>
+    <p:sldId id="267" r:id="rId13"/>
+    <p:sldId id="268" r:id="rId14"/>
+    <p:sldId id="269" r:id="rId15"/>
   </p:sldIdLst>
   <p:sldSz cx="12192000" cy="6858000"/>
   <p:notesSz cx="6858000" cy="9144000"/>
@@ -114,7 +117,16 @@
       </a:defRPr>
     </a:lvl9pPr>
   </p:defaultTextStyle>
+  <p:extLst>
+    <p:ext uri="{EFAFB233-063F-42B5-8137-9DF3F51BA10A}">
+      <p15:sldGuideLst xmlns:p15="http://schemas.microsoft.com/office/powerpoint/2012/main"/>
+    </p:ext>
+  </p:extLst>
 </p:presentation>
+</file>
+
+<file path=ppt/revisionInfo.xml><?xml version="1.0" encoding="utf-8"?>
+<p1510:revInfo xmlns:a="http://schemas.openxmlformats.org/drawingml/2006/main" xmlns:r="http://schemas.openxmlformats.org/officeDocument/2006/relationships" xmlns:p1510="http://schemas.microsoft.com/office/powerpoint/2015/10/main"/>
 </file>
 
 <file path=ppt/slideLayouts/slideLayout1.xml><?xml version="1.0" encoding="utf-8"?>
@@ -174,7 +186,7 @@
           <a:noFill/>
           <a:extLst>
             <a:ext uri="{909E8E84-426E-40dd-AFC4-6F175D3DCCD1}">
-              <a14:hiddenFill xmlns:a14="http://schemas.microsoft.com/office/drawing/2010/main" xmlns="">
+              <a14:hiddenFill xmlns="" xmlns:a14="http://schemas.microsoft.com/office/drawing/2010/main">
                 <a:solidFill>
                   <a:srgbClr val="FFFFFF"/>
                 </a:solidFill>
@@ -233,7 +245,7 @@
             </a:ln>
             <a:extLst>
               <a:ext uri="{91240B29-F687-4f45-9708-019B960494DF}">
-                <a14:hiddenLine xmlns:a14="http://schemas.microsoft.com/office/drawing/2010/main" xmlns="" w="9525">
+                <a14:hiddenLine xmlns="" xmlns:a14="http://schemas.microsoft.com/office/drawing/2010/main" w="9525">
                   <a:solidFill>
                     <a:srgbClr val="000000"/>
                   </a:solidFill>
@@ -323,7 +335,7 @@
             </a:ln>
             <a:extLst>
               <a:ext uri="{91240B29-F687-4f45-9708-019B960494DF}">
-                <a14:hiddenLine xmlns:a14="http://schemas.microsoft.com/office/drawing/2010/main" xmlns="" w="9525">
+                <a14:hiddenLine xmlns="" xmlns:a14="http://schemas.microsoft.com/office/drawing/2010/main" w="9525">
                   <a:solidFill>
                     <a:srgbClr val="000000"/>
                   </a:solidFill>
@@ -413,7 +425,7 @@
             </a:ln>
             <a:extLst>
               <a:ext uri="{91240B29-F687-4f45-9708-019B960494DF}">
-                <a14:hiddenLine xmlns:a14="http://schemas.microsoft.com/office/drawing/2010/main" xmlns="" w="9525">
+                <a14:hiddenLine xmlns="" xmlns:a14="http://schemas.microsoft.com/office/drawing/2010/main" w="9525">
                   <a:solidFill>
                     <a:srgbClr val="000000"/>
                   </a:solidFill>
@@ -447,7 +459,7 @@
             </a:ln>
             <a:extLst>
               <a:ext uri="{91240B29-F687-4f45-9708-019B960494DF}">
-                <a14:hiddenLine xmlns:a14="http://schemas.microsoft.com/office/drawing/2010/main" xmlns="" w="9525">
+                <a14:hiddenLine xmlns="" xmlns:a14="http://schemas.microsoft.com/office/drawing/2010/main" w="9525">
                   <a:solidFill>
                     <a:srgbClr val="000000"/>
                   </a:solidFill>
@@ -537,7 +549,7 @@
             </a:ln>
             <a:extLst>
               <a:ext uri="{91240B29-F687-4f45-9708-019B960494DF}">
-                <a14:hiddenLine xmlns:a14="http://schemas.microsoft.com/office/drawing/2010/main" xmlns="" w="9525">
+                <a14:hiddenLine xmlns="" xmlns:a14="http://schemas.microsoft.com/office/drawing/2010/main" w="9525">
                   <a:solidFill>
                     <a:srgbClr val="000000"/>
                   </a:solidFill>
@@ -599,7 +611,7 @@
             </a:ln>
             <a:extLst>
               <a:ext uri="{91240B29-F687-4f45-9708-019B960494DF}">
-                <a14:hiddenLine xmlns:a14="http://schemas.microsoft.com/office/drawing/2010/main" xmlns="" w="9525">
+                <a14:hiddenLine xmlns="" xmlns:a14="http://schemas.microsoft.com/office/drawing/2010/main" w="9525">
                   <a:solidFill>
                     <a:srgbClr val="000000"/>
                   </a:solidFill>
@@ -661,7 +673,7 @@
             </a:ln>
             <a:extLst>
               <a:ext uri="{91240B29-F687-4f45-9708-019B960494DF}">
-                <a14:hiddenLine xmlns:a14="http://schemas.microsoft.com/office/drawing/2010/main" xmlns="" w="9525">
+                <a14:hiddenLine xmlns="" xmlns:a14="http://schemas.microsoft.com/office/drawing/2010/main" w="9525">
                   <a:solidFill>
                     <a:srgbClr val="000000"/>
                   </a:solidFill>
@@ -751,7 +763,7 @@
             </a:ln>
             <a:extLst>
               <a:ext uri="{91240B29-F687-4f45-9708-019B960494DF}">
-                <a14:hiddenLine xmlns:a14="http://schemas.microsoft.com/office/drawing/2010/main" xmlns="" w="9525">
+                <a14:hiddenLine xmlns="" xmlns:a14="http://schemas.microsoft.com/office/drawing/2010/main" w="9525">
                   <a:solidFill>
                     <a:srgbClr val="000000"/>
                   </a:solidFill>
@@ -813,7 +825,7 @@
             </a:ln>
             <a:extLst>
               <a:ext uri="{91240B29-F687-4f45-9708-019B960494DF}">
-                <a14:hiddenLine xmlns:a14="http://schemas.microsoft.com/office/drawing/2010/main" xmlns="" w="9525">
+                <a14:hiddenLine xmlns="" xmlns:a14="http://schemas.microsoft.com/office/drawing/2010/main" w="9525">
                   <a:solidFill>
                     <a:srgbClr val="000000"/>
                   </a:solidFill>
@@ -875,7 +887,7 @@
             </a:ln>
             <a:extLst>
               <a:ext uri="{91240B29-F687-4f45-9708-019B960494DF}">
-                <a14:hiddenLine xmlns:a14="http://schemas.microsoft.com/office/drawing/2010/main" xmlns="" w="9525">
+                <a14:hiddenLine xmlns="" xmlns:a14="http://schemas.microsoft.com/office/drawing/2010/main" w="9525">
                   <a:solidFill>
                     <a:srgbClr val="000000"/>
                   </a:solidFill>
@@ -965,7 +977,7 @@
             </a:ln>
             <a:extLst>
               <a:ext uri="{91240B29-F687-4f45-9708-019B960494DF}">
-                <a14:hiddenLine xmlns:a14="http://schemas.microsoft.com/office/drawing/2010/main" xmlns="" w="9525">
+                <a14:hiddenLine xmlns="" xmlns:a14="http://schemas.microsoft.com/office/drawing/2010/main" w="9525">
                   <a:solidFill>
                     <a:srgbClr val="000000"/>
                   </a:solidFill>
@@ -1055,7 +1067,7 @@
             </a:ln>
             <a:extLst>
               <a:ext uri="{91240B29-F687-4f45-9708-019B960494DF}">
-                <a14:hiddenLine xmlns:a14="http://schemas.microsoft.com/office/drawing/2010/main" xmlns="" w="9525">
+                <a14:hiddenLine xmlns="" xmlns:a14="http://schemas.microsoft.com/office/drawing/2010/main" w="9525">
                   <a:solidFill>
                     <a:srgbClr val="000000"/>
                   </a:solidFill>
@@ -1117,7 +1129,7 @@
             </a:ln>
             <a:extLst>
               <a:ext uri="{91240B29-F687-4f45-9708-019B960494DF}">
-                <a14:hiddenLine xmlns:a14="http://schemas.microsoft.com/office/drawing/2010/main" xmlns="" w="9525">
+                <a14:hiddenLine xmlns="" xmlns:a14="http://schemas.microsoft.com/office/drawing/2010/main" w="9525">
                   <a:solidFill>
                     <a:srgbClr val="000000"/>
                   </a:solidFill>
@@ -1227,7 +1239,7 @@
             </a:ln>
             <a:extLst>
               <a:ext uri="{91240B29-F687-4f45-9708-019B960494DF}">
-                <a14:hiddenLine xmlns:a14="http://schemas.microsoft.com/office/drawing/2010/main" xmlns="" w="9525">
+                <a14:hiddenLine xmlns="" xmlns:a14="http://schemas.microsoft.com/office/drawing/2010/main" w="9525">
                   <a:solidFill>
                     <a:srgbClr val="000000"/>
                   </a:solidFill>
@@ -1289,7 +1301,7 @@
             </a:ln>
             <a:extLst>
               <a:ext uri="{91240B29-F687-4f45-9708-019B960494DF}">
-                <a14:hiddenLine xmlns:a14="http://schemas.microsoft.com/office/drawing/2010/main" xmlns="" w="9525">
+                <a14:hiddenLine xmlns="" xmlns:a14="http://schemas.microsoft.com/office/drawing/2010/main" w="9525">
                   <a:solidFill>
                     <a:srgbClr val="000000"/>
                   </a:solidFill>
@@ -1379,7 +1391,7 @@
             </a:ln>
             <a:extLst>
               <a:ext uri="{91240B29-F687-4f45-9708-019B960494DF}">
-                <a14:hiddenLine xmlns:a14="http://schemas.microsoft.com/office/drawing/2010/main" xmlns="" w="9525">
+                <a14:hiddenLine xmlns="" xmlns:a14="http://schemas.microsoft.com/office/drawing/2010/main" w="9525">
                   <a:solidFill>
                     <a:srgbClr val="000000"/>
                   </a:solidFill>
@@ -1469,7 +1481,7 @@
             </a:ln>
             <a:extLst>
               <a:ext uri="{91240B29-F687-4f45-9708-019B960494DF}">
-                <a14:hiddenLine xmlns:a14="http://schemas.microsoft.com/office/drawing/2010/main" xmlns="" w="9525">
+                <a14:hiddenLine xmlns="" xmlns:a14="http://schemas.microsoft.com/office/drawing/2010/main" w="9525">
                   <a:solidFill>
                     <a:srgbClr val="000000"/>
                   </a:solidFill>
@@ -1531,7 +1543,7 @@
             </a:ln>
             <a:extLst>
               <a:ext uri="{91240B29-F687-4f45-9708-019B960494DF}">
-                <a14:hiddenLine xmlns:a14="http://schemas.microsoft.com/office/drawing/2010/main" xmlns="" w="9525">
+                <a14:hiddenLine xmlns="" xmlns:a14="http://schemas.microsoft.com/office/drawing/2010/main" w="9525">
                   <a:solidFill>
                     <a:srgbClr val="000000"/>
                   </a:solidFill>
@@ -1621,7 +1633,7 @@
             </a:ln>
             <a:extLst>
               <a:ext uri="{91240B29-F687-4f45-9708-019B960494DF}">
-                <a14:hiddenLine xmlns:a14="http://schemas.microsoft.com/office/drawing/2010/main" xmlns="" w="9525">
+                <a14:hiddenLine xmlns="" xmlns:a14="http://schemas.microsoft.com/office/drawing/2010/main" w="9525">
                   <a:solidFill>
                     <a:srgbClr val="000000"/>
                   </a:solidFill>
@@ -1711,7 +1723,7 @@
             </a:ln>
             <a:extLst>
               <a:ext uri="{91240B29-F687-4f45-9708-019B960494DF}">
-                <a14:hiddenLine xmlns:a14="http://schemas.microsoft.com/office/drawing/2010/main" xmlns="" w="9525">
+                <a14:hiddenLine xmlns="" xmlns:a14="http://schemas.microsoft.com/office/drawing/2010/main" w="9525">
                   <a:solidFill>
                     <a:srgbClr val="000000"/>
                   </a:solidFill>
@@ -1767,7 +1779,7 @@
             </a:ln>
             <a:extLst>
               <a:ext uri="{91240B29-F687-4f45-9708-019B960494DF}">
-                <a14:hiddenLine xmlns:a14="http://schemas.microsoft.com/office/drawing/2010/main" xmlns="" w="9525">
+                <a14:hiddenLine xmlns="" xmlns:a14="http://schemas.microsoft.com/office/drawing/2010/main" w="9525">
                   <a:solidFill>
                     <a:srgbClr val="000000"/>
                   </a:solidFill>
@@ -1857,7 +1869,7 @@
             </a:ln>
             <a:extLst>
               <a:ext uri="{91240B29-F687-4f45-9708-019B960494DF}">
-                <a14:hiddenLine xmlns:a14="http://schemas.microsoft.com/office/drawing/2010/main" xmlns="" w="9525">
+                <a14:hiddenLine xmlns="" xmlns:a14="http://schemas.microsoft.com/office/drawing/2010/main" w="9525">
                   <a:solidFill>
                     <a:srgbClr val="000000"/>
                   </a:solidFill>
@@ -1913,7 +1925,7 @@
             </a:ln>
             <a:extLst>
               <a:ext uri="{91240B29-F687-4f45-9708-019B960494DF}">
-                <a14:hiddenLine xmlns:a14="http://schemas.microsoft.com/office/drawing/2010/main" xmlns="" w="9525">
+                <a14:hiddenLine xmlns="" xmlns:a14="http://schemas.microsoft.com/office/drawing/2010/main" w="9525">
                   <a:solidFill>
                     <a:srgbClr val="000000"/>
                   </a:solidFill>
@@ -2003,7 +2015,7 @@
             </a:ln>
             <a:extLst>
               <a:ext uri="{91240B29-F687-4f45-9708-019B960494DF}">
-                <a14:hiddenLine xmlns:a14="http://schemas.microsoft.com/office/drawing/2010/main" xmlns="" w="9525">
+                <a14:hiddenLine xmlns="" xmlns:a14="http://schemas.microsoft.com/office/drawing/2010/main" w="9525">
                   <a:solidFill>
                     <a:srgbClr val="000000"/>
                   </a:solidFill>
@@ -2071,7 +2083,7 @@
             </a:ln>
             <a:extLst>
               <a:ext uri="{91240B29-F687-4f45-9708-019B960494DF}">
-                <a14:hiddenLine xmlns:a14="http://schemas.microsoft.com/office/drawing/2010/main" xmlns="" w="9525">
+                <a14:hiddenLine xmlns="" xmlns:a14="http://schemas.microsoft.com/office/drawing/2010/main" w="9525">
                   <a:solidFill>
                     <a:srgbClr val="000000"/>
                   </a:solidFill>
@@ -2161,7 +2173,7 @@
             </a:ln>
             <a:extLst>
               <a:ext uri="{91240B29-F687-4f45-9708-019B960494DF}">
-                <a14:hiddenLine xmlns:a14="http://schemas.microsoft.com/office/drawing/2010/main" xmlns="" w="9525">
+                <a14:hiddenLine xmlns="" xmlns:a14="http://schemas.microsoft.com/office/drawing/2010/main" w="9525">
                   <a:solidFill>
                     <a:srgbClr val="000000"/>
                   </a:solidFill>
@@ -2229,7 +2241,7 @@
             </a:ln>
             <a:extLst>
               <a:ext uri="{91240B29-F687-4f45-9708-019B960494DF}">
-                <a14:hiddenLine xmlns:a14="http://schemas.microsoft.com/office/drawing/2010/main" xmlns="" w="9525">
+                <a14:hiddenLine xmlns="" xmlns:a14="http://schemas.microsoft.com/office/drawing/2010/main" w="9525">
                   <a:solidFill>
                     <a:srgbClr val="000000"/>
                   </a:solidFill>
@@ -2319,7 +2331,7 @@
             </a:ln>
             <a:extLst>
               <a:ext uri="{91240B29-F687-4f45-9708-019B960494DF}">
-                <a14:hiddenLine xmlns:a14="http://schemas.microsoft.com/office/drawing/2010/main" xmlns="" w="9525">
+                <a14:hiddenLine xmlns="" xmlns:a14="http://schemas.microsoft.com/office/drawing/2010/main" w="9525">
                   <a:solidFill>
                     <a:srgbClr val="000000"/>
                   </a:solidFill>
@@ -2353,7 +2365,7 @@
             </a:ln>
             <a:extLst>
               <a:ext uri="{91240B29-F687-4f45-9708-019B960494DF}">
-                <a14:hiddenLine xmlns:a14="http://schemas.microsoft.com/office/drawing/2010/main" xmlns="" w="9525">
+                <a14:hiddenLine xmlns="" xmlns:a14="http://schemas.microsoft.com/office/drawing/2010/main" w="9525">
                   <a:solidFill>
                     <a:srgbClr val="000000"/>
                   </a:solidFill>
@@ -2443,7 +2455,7 @@
             </a:ln>
             <a:extLst>
               <a:ext uri="{91240B29-F687-4f45-9708-019B960494DF}">
-                <a14:hiddenLine xmlns:a14="http://schemas.microsoft.com/office/drawing/2010/main" xmlns="" w="9525">
+                <a14:hiddenLine xmlns="" xmlns:a14="http://schemas.microsoft.com/office/drawing/2010/main" w="9525">
                   <a:solidFill>
                     <a:srgbClr val="000000"/>
                   </a:solidFill>
@@ -2505,7 +2517,7 @@
             </a:ln>
             <a:extLst>
               <a:ext uri="{91240B29-F687-4f45-9708-019B960494DF}">
-                <a14:hiddenLine xmlns:a14="http://schemas.microsoft.com/office/drawing/2010/main" xmlns="" w="9525">
+                <a14:hiddenLine xmlns="" xmlns:a14="http://schemas.microsoft.com/office/drawing/2010/main" w="9525">
                   <a:solidFill>
                     <a:srgbClr val="000000"/>
                   </a:solidFill>
@@ -2567,7 +2579,7 @@
             </a:ln>
             <a:extLst>
               <a:ext uri="{91240B29-F687-4f45-9708-019B960494DF}">
-                <a14:hiddenLine xmlns:a14="http://schemas.microsoft.com/office/drawing/2010/main" xmlns="" w="9525">
+                <a14:hiddenLine xmlns="" xmlns:a14="http://schemas.microsoft.com/office/drawing/2010/main" w="9525">
                   <a:solidFill>
                     <a:srgbClr val="000000"/>
                   </a:solidFill>
@@ -2657,7 +2669,7 @@
             </a:ln>
             <a:extLst>
               <a:ext uri="{91240B29-F687-4f45-9708-019B960494DF}">
-                <a14:hiddenLine xmlns:a14="http://schemas.microsoft.com/office/drawing/2010/main" xmlns="" w="9525">
+                <a14:hiddenLine xmlns="" xmlns:a14="http://schemas.microsoft.com/office/drawing/2010/main" w="9525">
                   <a:solidFill>
                     <a:srgbClr val="000000"/>
                   </a:solidFill>
@@ -2725,7 +2737,7 @@
             </a:ln>
             <a:extLst>
               <a:ext uri="{91240B29-F687-4f45-9708-019B960494DF}">
-                <a14:hiddenLine xmlns:a14="http://schemas.microsoft.com/office/drawing/2010/main" xmlns="" w="9525">
+                <a14:hiddenLine xmlns="" xmlns:a14="http://schemas.microsoft.com/office/drawing/2010/main" w="9525">
                   <a:solidFill>
                     <a:srgbClr val="000000"/>
                   </a:solidFill>
@@ -2787,7 +2799,7 @@
             </a:ln>
             <a:extLst>
               <a:ext uri="{91240B29-F687-4f45-9708-019B960494DF}">
-                <a14:hiddenLine xmlns:a14="http://schemas.microsoft.com/office/drawing/2010/main" xmlns="" w="9525">
+                <a14:hiddenLine xmlns="" xmlns:a14="http://schemas.microsoft.com/office/drawing/2010/main" w="9525">
                   <a:solidFill>
                     <a:srgbClr val="000000"/>
                   </a:solidFill>
@@ -2877,7 +2889,7 @@
             </a:ln>
             <a:extLst>
               <a:ext uri="{91240B29-F687-4f45-9708-019B960494DF}">
-                <a14:hiddenLine xmlns:a14="http://schemas.microsoft.com/office/drawing/2010/main" xmlns="" w="9525">
+                <a14:hiddenLine xmlns="" xmlns:a14="http://schemas.microsoft.com/office/drawing/2010/main" w="9525">
                   <a:solidFill>
                     <a:srgbClr val="000000"/>
                   </a:solidFill>
@@ -2939,7 +2951,7 @@
             </a:ln>
             <a:extLst>
               <a:ext uri="{91240B29-F687-4f45-9708-019B960494DF}">
-                <a14:hiddenLine xmlns:a14="http://schemas.microsoft.com/office/drawing/2010/main" xmlns="" w="9525">
+                <a14:hiddenLine xmlns="" xmlns:a14="http://schemas.microsoft.com/office/drawing/2010/main" w="9525">
                   <a:solidFill>
                     <a:srgbClr val="000000"/>
                   </a:solidFill>
@@ -3029,7 +3041,7 @@
             </a:ln>
             <a:extLst>
               <a:ext uri="{91240B29-F687-4f45-9708-019B960494DF}">
-                <a14:hiddenLine xmlns:a14="http://schemas.microsoft.com/office/drawing/2010/main" xmlns="" w="9525">
+                <a14:hiddenLine xmlns="" xmlns:a14="http://schemas.microsoft.com/office/drawing/2010/main" w="9525">
                   <a:solidFill>
                     <a:srgbClr val="000000"/>
                   </a:solidFill>
@@ -3091,7 +3103,7 @@
             </a:ln>
             <a:extLst>
               <a:ext uri="{91240B29-F687-4f45-9708-019B960494DF}">
-                <a14:hiddenLine xmlns:a14="http://schemas.microsoft.com/office/drawing/2010/main" xmlns="" w="9525">
+                <a14:hiddenLine xmlns="" xmlns:a14="http://schemas.microsoft.com/office/drawing/2010/main" w="9525">
                   <a:solidFill>
                     <a:srgbClr val="000000"/>
                   </a:solidFill>
@@ -3181,7 +3193,7 @@
             </a:ln>
             <a:extLst>
               <a:ext uri="{91240B29-F687-4f45-9708-019B960494DF}">
-                <a14:hiddenLine xmlns:a14="http://schemas.microsoft.com/office/drawing/2010/main" xmlns="" w="9525">
+                <a14:hiddenLine xmlns="" xmlns:a14="http://schemas.microsoft.com/office/drawing/2010/main" w="9525">
                   <a:solidFill>
                     <a:srgbClr val="000000"/>
                   </a:solidFill>
@@ -3215,7 +3227,7 @@
             </a:ln>
             <a:extLst>
               <a:ext uri="{91240B29-F687-4f45-9708-019B960494DF}">
-                <a14:hiddenLine xmlns:a14="http://schemas.microsoft.com/office/drawing/2010/main" xmlns="" w="9525">
+                <a14:hiddenLine xmlns="" xmlns:a14="http://schemas.microsoft.com/office/drawing/2010/main" w="9525">
                   <a:solidFill>
                     <a:srgbClr val="000000"/>
                   </a:solidFill>
@@ -3280,7 +3292,7 @@
             </a:ln>
             <a:extLst>
               <a:ext uri="{91240B29-F687-4f45-9708-019B960494DF}">
-                <a14:hiddenLine xmlns:a14="http://schemas.microsoft.com/office/drawing/2010/main" xmlns="" w="9525">
+                <a14:hiddenLine xmlns="" xmlns:a14="http://schemas.microsoft.com/office/drawing/2010/main" w="9525">
                   <a:solidFill>
                     <a:srgbClr val="000000"/>
                   </a:solidFill>
@@ -3370,7 +3382,7 @@
             </a:ln>
             <a:extLst>
               <a:ext uri="{91240B29-F687-4f45-9708-019B960494DF}">
-                <a14:hiddenLine xmlns:a14="http://schemas.microsoft.com/office/drawing/2010/main" xmlns="" w="9525">
+                <a14:hiddenLine xmlns="" xmlns:a14="http://schemas.microsoft.com/office/drawing/2010/main" w="9525">
                   <a:solidFill>
                     <a:srgbClr val="000000"/>
                   </a:solidFill>
@@ -3432,7 +3444,7 @@
             </a:ln>
             <a:extLst>
               <a:ext uri="{91240B29-F687-4f45-9708-019B960494DF}">
-                <a14:hiddenLine xmlns:a14="http://schemas.microsoft.com/office/drawing/2010/main" xmlns="" w="9525">
+                <a14:hiddenLine xmlns="" xmlns:a14="http://schemas.microsoft.com/office/drawing/2010/main" w="9525">
                   <a:solidFill>
                     <a:srgbClr val="000000"/>
                   </a:solidFill>
@@ -3522,7 +3534,7 @@
             </a:ln>
             <a:extLst>
               <a:ext uri="{91240B29-F687-4f45-9708-019B960494DF}">
-                <a14:hiddenLine xmlns:a14="http://schemas.microsoft.com/office/drawing/2010/main" xmlns="" w="9525">
+                <a14:hiddenLine xmlns="" xmlns:a14="http://schemas.microsoft.com/office/drawing/2010/main" w="9525">
                   <a:solidFill>
                     <a:srgbClr val="000000"/>
                   </a:solidFill>
@@ -3612,7 +3624,7 @@
             </a:ln>
             <a:extLst>
               <a:ext uri="{91240B29-F687-4f45-9708-019B960494DF}">
-                <a14:hiddenLine xmlns:a14="http://schemas.microsoft.com/office/drawing/2010/main" xmlns="" w="9525">
+                <a14:hiddenLine xmlns="" xmlns:a14="http://schemas.microsoft.com/office/drawing/2010/main" w="9525">
                   <a:solidFill>
                     <a:srgbClr val="000000"/>
                   </a:solidFill>
@@ -3677,7 +3689,7 @@
             </a:ln>
             <a:extLst>
               <a:ext uri="{91240B29-F687-4f45-9708-019B960494DF}">
-                <a14:hiddenLine xmlns:a14="http://schemas.microsoft.com/office/drawing/2010/main" xmlns="" w="9525">
+                <a14:hiddenLine xmlns="" xmlns:a14="http://schemas.microsoft.com/office/drawing/2010/main" w="9525">
                   <a:solidFill>
                     <a:srgbClr val="000000"/>
                   </a:solidFill>
@@ -3739,7 +3751,7 @@
             </a:ln>
             <a:extLst>
               <a:ext uri="{91240B29-F687-4f45-9708-019B960494DF}">
-                <a14:hiddenLine xmlns:a14="http://schemas.microsoft.com/office/drawing/2010/main" xmlns="" w="9525">
+                <a14:hiddenLine xmlns="" xmlns:a14="http://schemas.microsoft.com/office/drawing/2010/main" w="9525">
                   <a:solidFill>
                     <a:srgbClr val="000000"/>
                   </a:solidFill>
@@ -3829,7 +3841,7 @@
             </a:ln>
             <a:extLst>
               <a:ext uri="{91240B29-F687-4f45-9708-019B960494DF}">
-                <a14:hiddenLine xmlns:a14="http://schemas.microsoft.com/office/drawing/2010/main" xmlns="" w="9525">
+                <a14:hiddenLine xmlns="" xmlns:a14="http://schemas.microsoft.com/office/drawing/2010/main" w="9525">
                   <a:solidFill>
                     <a:srgbClr val="000000"/>
                   </a:solidFill>
@@ -3919,7 +3931,7 @@
             </a:ln>
             <a:extLst>
               <a:ext uri="{91240B29-F687-4f45-9708-019B960494DF}">
-                <a14:hiddenLine xmlns:a14="http://schemas.microsoft.com/office/drawing/2010/main" xmlns="" w="9525">
+                <a14:hiddenLine xmlns="" xmlns:a14="http://schemas.microsoft.com/office/drawing/2010/main" w="9525">
                   <a:solidFill>
                     <a:srgbClr val="000000"/>
                   </a:solidFill>
@@ -3981,7 +3993,7 @@
             </a:ln>
             <a:extLst>
               <a:ext uri="{91240B29-F687-4f45-9708-019B960494DF}">
-                <a14:hiddenLine xmlns:a14="http://schemas.microsoft.com/office/drawing/2010/main" xmlns="" w="9525">
+                <a14:hiddenLine xmlns="" xmlns:a14="http://schemas.microsoft.com/office/drawing/2010/main" w="9525">
                   <a:solidFill>
                     <a:srgbClr val="000000"/>
                   </a:solidFill>
@@ -4101,7 +4113,7 @@
             </a:ln>
             <a:extLst>
               <a:ext uri="{91240B29-F687-4f45-9708-019B960494DF}">
-                <a14:hiddenLine xmlns:a14="http://schemas.microsoft.com/office/drawing/2010/main" xmlns="" w="9525">
+                <a14:hiddenLine xmlns="" xmlns:a14="http://schemas.microsoft.com/office/drawing/2010/main" w="9525">
                   <a:solidFill>
                     <a:srgbClr val="000000"/>
                   </a:solidFill>
@@ -4169,7 +4181,7 @@
             </a:ln>
             <a:extLst>
               <a:ext uri="{91240B29-F687-4f45-9708-019B960494DF}">
-                <a14:hiddenLine xmlns:a14="http://schemas.microsoft.com/office/drawing/2010/main" xmlns="" w="9525">
+                <a14:hiddenLine xmlns="" xmlns:a14="http://schemas.microsoft.com/office/drawing/2010/main" w="9525">
                   <a:solidFill>
                     <a:srgbClr val="000000"/>
                   </a:solidFill>
@@ -4259,7 +4271,7 @@
             </a:ln>
             <a:extLst>
               <a:ext uri="{91240B29-F687-4f45-9708-019B960494DF}">
-                <a14:hiddenLine xmlns:a14="http://schemas.microsoft.com/office/drawing/2010/main" xmlns="" w="9525">
+                <a14:hiddenLine xmlns="" xmlns:a14="http://schemas.microsoft.com/office/drawing/2010/main" w="9525">
                   <a:solidFill>
                     <a:srgbClr val="000000"/>
                   </a:solidFill>
@@ -4399,7 +4411,7 @@
           <a:p>
             <a:fld id="{48A87A34-81AB-432B-8DAE-1953F412C126}" type="datetimeFigureOut">
               <a:rPr lang="en-US" dirty="0"/>
-              <a:t>8/29/2017</a:t>
+              <a:t>9/2/2017</a:t>
             </a:fld>
             <a:endParaRPr lang="en-US" dirty="0"/>
           </a:p>
@@ -4661,7 +4673,7 @@
           <a:p>
             <a:fld id="{48A87A34-81AB-432B-8DAE-1953F412C126}" type="datetimeFigureOut">
               <a:rPr lang="en-US" dirty="0"/>
-              <a:t>8/29/2017</a:t>
+              <a:t>9/2/2017</a:t>
             </a:fld>
             <a:endParaRPr lang="en-US" dirty="0"/>
           </a:p>
@@ -4852,7 +4864,7 @@
           <a:p>
             <a:fld id="{48A87A34-81AB-432B-8DAE-1953F412C126}" type="datetimeFigureOut">
               <a:rPr lang="en-US" dirty="0"/>
-              <a:t>8/29/2017</a:t>
+              <a:t>9/2/2017</a:t>
             </a:fld>
             <a:endParaRPr lang="en-US" dirty="0"/>
           </a:p>
@@ -5110,7 +5122,7 @@
           <a:p>
             <a:fld id="{48A87A34-81AB-432B-8DAE-1953F412C126}" type="datetimeFigureOut">
               <a:rPr lang="en-US" dirty="0"/>
-              <a:t>8/29/2017</a:t>
+              <a:t>9/2/2017</a:t>
             </a:fld>
             <a:endParaRPr lang="en-US" dirty="0"/>
           </a:p>
@@ -5539,7 +5551,7 @@
           <a:p>
             <a:fld id="{48A87A34-81AB-432B-8DAE-1953F412C126}" type="datetimeFigureOut">
               <a:rPr lang="en-US" dirty="0"/>
-              <a:t>8/29/2017</a:t>
+              <a:t>9/2/2017</a:t>
             </a:fld>
             <a:endParaRPr lang="en-US" dirty="0"/>
           </a:p>
@@ -6080,7 +6092,7 @@
           <a:p>
             <a:fld id="{48A87A34-81AB-432B-8DAE-1953F412C126}" type="datetimeFigureOut">
               <a:rPr lang="en-US" dirty="0"/>
-              <a:t>8/29/2017</a:t>
+              <a:t>9/2/2017</a:t>
             </a:fld>
             <a:endParaRPr lang="en-US" dirty="0"/>
           </a:p>
@@ -6795,7 +6807,7 @@
           <a:p>
             <a:fld id="{48A87A34-81AB-432B-8DAE-1953F412C126}" type="datetimeFigureOut">
               <a:rPr lang="en-US" dirty="0"/>
-              <a:t>8/29/2017</a:t>
+              <a:t>9/2/2017</a:t>
             </a:fld>
             <a:endParaRPr lang="en-US" dirty="0"/>
           </a:p>
@@ -6960,7 +6972,7 @@
           <a:p>
             <a:fld id="{48A87A34-81AB-432B-8DAE-1953F412C126}" type="datetimeFigureOut">
               <a:rPr lang="en-US" dirty="0"/>
-              <a:t>8/29/2017</a:t>
+              <a:t>9/2/2017</a:t>
             </a:fld>
             <a:endParaRPr lang="en-US" dirty="0"/>
           </a:p>
@@ -7135,7 +7147,7 @@
           <a:p>
             <a:fld id="{48A87A34-81AB-432B-8DAE-1953F412C126}" type="datetimeFigureOut">
               <a:rPr lang="en-US" dirty="0"/>
-              <a:t>8/29/2017</a:t>
+              <a:t>9/2/2017</a:t>
             </a:fld>
             <a:endParaRPr lang="en-US" dirty="0"/>
           </a:p>
@@ -7300,7 +7312,7 @@
           <a:p>
             <a:fld id="{48A87A34-81AB-432B-8DAE-1953F412C126}" type="datetimeFigureOut">
               <a:rPr lang="en-US" dirty="0"/>
-              <a:t>8/29/2017</a:t>
+              <a:t>9/2/2017</a:t>
             </a:fld>
             <a:endParaRPr lang="en-US" dirty="0"/>
           </a:p>
@@ -7545,7 +7557,7 @@
           <a:p>
             <a:fld id="{48A87A34-81AB-432B-8DAE-1953F412C126}" type="datetimeFigureOut">
               <a:rPr lang="en-US" dirty="0"/>
-              <a:t>8/29/2017</a:t>
+              <a:t>9/2/2017</a:t>
             </a:fld>
             <a:endParaRPr lang="en-US" dirty="0"/>
           </a:p>
@@ -7772,7 +7784,7 @@
           <a:p>
             <a:fld id="{48A87A34-81AB-432B-8DAE-1953F412C126}" type="datetimeFigureOut">
               <a:rPr lang="en-US" dirty="0"/>
-              <a:t>8/29/2017</a:t>
+              <a:t>9/2/2017</a:t>
             </a:fld>
             <a:endParaRPr lang="en-US" dirty="0"/>
           </a:p>
@@ -8148,7 +8160,7 @@
           <a:p>
             <a:fld id="{48A87A34-81AB-432B-8DAE-1953F412C126}" type="datetimeFigureOut">
               <a:rPr lang="en-US" dirty="0"/>
-              <a:t>8/29/2017</a:t>
+              <a:t>9/2/2017</a:t>
             </a:fld>
             <a:endParaRPr lang="en-US" dirty="0"/>
           </a:p>
@@ -8261,7 +8273,7 @@
           <a:p>
             <a:fld id="{48A87A34-81AB-432B-8DAE-1953F412C126}" type="datetimeFigureOut">
               <a:rPr lang="en-US" dirty="0"/>
-              <a:t>8/29/2017</a:t>
+              <a:t>9/2/2017</a:t>
             </a:fld>
             <a:endParaRPr lang="en-US" dirty="0"/>
           </a:p>
@@ -8351,7 +8363,7 @@
           <a:p>
             <a:fld id="{48A87A34-81AB-432B-8DAE-1953F412C126}" type="datetimeFigureOut">
               <a:rPr lang="en-US" dirty="0"/>
-              <a:t>8/29/2017</a:t>
+              <a:t>9/2/2017</a:t>
             </a:fld>
             <a:endParaRPr lang="en-US" dirty="0"/>
           </a:p>
@@ -8595,7 +8607,7 @@
           <a:p>
             <a:fld id="{48A87A34-81AB-432B-8DAE-1953F412C126}" type="datetimeFigureOut">
               <a:rPr lang="en-US" dirty="0"/>
-              <a:t>8/29/2017</a:t>
+              <a:t>9/2/2017</a:t>
             </a:fld>
             <a:endParaRPr lang="en-US" dirty="0"/>
           </a:p>
@@ -8870,7 +8882,7 @@
           <a:p>
             <a:fld id="{48A87A34-81AB-432B-8DAE-1953F412C126}" type="datetimeFigureOut">
               <a:rPr lang="en-US" dirty="0"/>
-              <a:t>8/29/2017</a:t>
+              <a:t>9/2/2017</a:t>
             </a:fld>
             <a:endParaRPr lang="en-US" dirty="0"/>
           </a:p>
@@ -8988,7 +9000,7 @@
           <a:noFill/>
           <a:extLst>
             <a:ext uri="{909E8E84-426E-40dd-AFC4-6F175D3DCCD1}">
-              <a14:hiddenFill xmlns:a14="http://schemas.microsoft.com/office/drawing/2010/main" xmlns="">
+              <a14:hiddenFill xmlns="" xmlns:a14="http://schemas.microsoft.com/office/drawing/2010/main">
                 <a:solidFill>
                   <a:srgbClr val="FFFFFF"/>
                 </a:solidFill>
@@ -9062,7 +9074,7 @@
               </a:ln>
               <a:extLst>
                 <a:ext uri="{91240B29-F687-4f45-9708-019B960494DF}">
-                  <a14:hiddenLine xmlns:a14="http://schemas.microsoft.com/office/drawing/2010/main" xmlns="" w="9525">
+                  <a14:hiddenLine xmlns="" xmlns:a14="http://schemas.microsoft.com/office/drawing/2010/main" w="9525">
                     <a:solidFill>
                       <a:srgbClr val="000000"/>
                     </a:solidFill>
@@ -9152,7 +9164,7 @@
               </a:ln>
               <a:extLst>
                 <a:ext uri="{91240B29-F687-4f45-9708-019B960494DF}">
-                  <a14:hiddenLine xmlns:a14="http://schemas.microsoft.com/office/drawing/2010/main" xmlns="" w="9525">
+                  <a14:hiddenLine xmlns="" xmlns:a14="http://schemas.microsoft.com/office/drawing/2010/main" w="9525">
                     <a:solidFill>
                       <a:srgbClr val="000000"/>
                     </a:solidFill>
@@ -9242,7 +9254,7 @@
               </a:ln>
               <a:extLst>
                 <a:ext uri="{91240B29-F687-4f45-9708-019B960494DF}">
-                  <a14:hiddenLine xmlns:a14="http://schemas.microsoft.com/office/drawing/2010/main" xmlns="" w="9525">
+                  <a14:hiddenLine xmlns="" xmlns:a14="http://schemas.microsoft.com/office/drawing/2010/main" w="9525">
                     <a:solidFill>
                       <a:srgbClr val="000000"/>
                     </a:solidFill>
@@ -9304,7 +9316,7 @@
               </a:ln>
               <a:extLst>
                 <a:ext uri="{91240B29-F687-4f45-9708-019B960494DF}">
-                  <a14:hiddenLine xmlns:a14="http://schemas.microsoft.com/office/drawing/2010/main" xmlns="" w="9525">
+                  <a14:hiddenLine xmlns="" xmlns:a14="http://schemas.microsoft.com/office/drawing/2010/main" w="9525">
                     <a:solidFill>
                       <a:srgbClr val="000000"/>
                     </a:solidFill>
@@ -9394,7 +9406,7 @@
               </a:ln>
               <a:extLst>
                 <a:ext uri="{91240B29-F687-4f45-9708-019B960494DF}">
-                  <a14:hiddenLine xmlns:a14="http://schemas.microsoft.com/office/drawing/2010/main" xmlns="" w="9525">
+                  <a14:hiddenLine xmlns="" xmlns:a14="http://schemas.microsoft.com/office/drawing/2010/main" w="9525">
                     <a:solidFill>
                       <a:srgbClr val="000000"/>
                     </a:solidFill>
@@ -9456,7 +9468,7 @@
               </a:ln>
               <a:extLst>
                 <a:ext uri="{91240B29-F687-4f45-9708-019B960494DF}">
-                  <a14:hiddenLine xmlns:a14="http://schemas.microsoft.com/office/drawing/2010/main" xmlns="" w="9525">
+                  <a14:hiddenLine xmlns="" xmlns:a14="http://schemas.microsoft.com/office/drawing/2010/main" w="9525">
                     <a:solidFill>
                       <a:srgbClr val="000000"/>
                     </a:solidFill>
@@ -9518,7 +9530,7 @@
               </a:ln>
               <a:extLst>
                 <a:ext uri="{91240B29-F687-4f45-9708-019B960494DF}">
-                  <a14:hiddenLine xmlns:a14="http://schemas.microsoft.com/office/drawing/2010/main" xmlns="" w="9525">
+                  <a14:hiddenLine xmlns="" xmlns:a14="http://schemas.microsoft.com/office/drawing/2010/main" w="9525">
                     <a:solidFill>
                       <a:srgbClr val="000000"/>
                     </a:solidFill>
@@ -9608,7 +9620,7 @@
               </a:ln>
               <a:extLst>
                 <a:ext uri="{91240B29-F687-4f45-9708-019B960494DF}">
-                  <a14:hiddenLine xmlns:a14="http://schemas.microsoft.com/office/drawing/2010/main" xmlns="" w="9525">
+                  <a14:hiddenLine xmlns="" xmlns:a14="http://schemas.microsoft.com/office/drawing/2010/main" w="9525">
                     <a:solidFill>
                       <a:srgbClr val="000000"/>
                     </a:solidFill>
@@ -9698,7 +9710,7 @@
               </a:ln>
               <a:extLst>
                 <a:ext uri="{91240B29-F687-4f45-9708-019B960494DF}">
-                  <a14:hiddenLine xmlns:a14="http://schemas.microsoft.com/office/drawing/2010/main" xmlns="" w="9525">
+                  <a14:hiddenLine xmlns="" xmlns:a14="http://schemas.microsoft.com/office/drawing/2010/main" w="9525">
                     <a:solidFill>
                       <a:srgbClr val="000000"/>
                     </a:solidFill>
@@ -9760,7 +9772,7 @@
               </a:ln>
               <a:extLst>
                 <a:ext uri="{91240B29-F687-4f45-9708-019B960494DF}">
-                  <a14:hiddenLine xmlns:a14="http://schemas.microsoft.com/office/drawing/2010/main" xmlns="" w="9525">
+                  <a14:hiddenLine xmlns="" xmlns:a14="http://schemas.microsoft.com/office/drawing/2010/main" w="9525">
                     <a:solidFill>
                       <a:srgbClr val="000000"/>
                     </a:solidFill>
@@ -9870,7 +9882,7 @@
               </a:ln>
               <a:extLst>
                 <a:ext uri="{91240B29-F687-4f45-9708-019B960494DF}">
-                  <a14:hiddenLine xmlns:a14="http://schemas.microsoft.com/office/drawing/2010/main" xmlns="" w="9525">
+                  <a14:hiddenLine xmlns="" xmlns:a14="http://schemas.microsoft.com/office/drawing/2010/main" w="9525">
                     <a:solidFill>
                       <a:srgbClr val="000000"/>
                     </a:solidFill>
@@ -9954,7 +9966,7 @@
               </a:ln>
               <a:extLst>
                 <a:ext uri="{91240B29-F687-4f45-9708-019B960494DF}">
-                  <a14:hiddenLine xmlns:a14="http://schemas.microsoft.com/office/drawing/2010/main" xmlns="" w="9525">
+                  <a14:hiddenLine xmlns="" xmlns:a14="http://schemas.microsoft.com/office/drawing/2010/main" w="9525">
                     <a:solidFill>
                       <a:srgbClr val="000000"/>
                     </a:solidFill>
@@ -10016,7 +10028,7 @@
               </a:ln>
               <a:extLst>
                 <a:ext uri="{91240B29-F687-4f45-9708-019B960494DF}">
-                  <a14:hiddenLine xmlns:a14="http://schemas.microsoft.com/office/drawing/2010/main" xmlns="" w="9525">
+                  <a14:hiddenLine xmlns="" xmlns:a14="http://schemas.microsoft.com/office/drawing/2010/main" w="9525">
                     <a:solidFill>
                       <a:srgbClr val="000000"/>
                     </a:solidFill>
@@ -10078,7 +10090,7 @@
               </a:ln>
               <a:extLst>
                 <a:ext uri="{91240B29-F687-4f45-9708-019B960494DF}">
-                  <a14:hiddenLine xmlns:a14="http://schemas.microsoft.com/office/drawing/2010/main" xmlns="" w="9525">
+                  <a14:hiddenLine xmlns="" xmlns:a14="http://schemas.microsoft.com/office/drawing/2010/main" w="9525">
                     <a:solidFill>
                       <a:srgbClr val="000000"/>
                     </a:solidFill>
@@ -10168,7 +10180,7 @@
               </a:ln>
               <a:extLst>
                 <a:ext uri="{91240B29-F687-4f45-9708-019B960494DF}">
-                  <a14:hiddenLine xmlns:a14="http://schemas.microsoft.com/office/drawing/2010/main" xmlns="" w="9525">
+                  <a14:hiddenLine xmlns="" xmlns:a14="http://schemas.microsoft.com/office/drawing/2010/main" w="9525">
                     <a:solidFill>
                       <a:srgbClr val="000000"/>
                     </a:solidFill>
@@ -10202,7 +10214,7 @@
               </a:ln>
               <a:extLst>
                 <a:ext uri="{91240B29-F687-4f45-9708-019B960494DF}">
-                  <a14:hiddenLine xmlns:a14="http://schemas.microsoft.com/office/drawing/2010/main" xmlns="" w="9525">
+                  <a14:hiddenLine xmlns="" xmlns:a14="http://schemas.microsoft.com/office/drawing/2010/main" w="9525">
                     <a:solidFill>
                       <a:srgbClr val="000000"/>
                     </a:solidFill>
@@ -10267,7 +10279,7 @@
               </a:ln>
               <a:extLst>
                 <a:ext uri="{91240B29-F687-4f45-9708-019B960494DF}">
-                  <a14:hiddenLine xmlns:a14="http://schemas.microsoft.com/office/drawing/2010/main" xmlns="" w="9525">
+                  <a14:hiddenLine xmlns="" xmlns:a14="http://schemas.microsoft.com/office/drawing/2010/main" w="9525">
                     <a:solidFill>
                       <a:srgbClr val="000000"/>
                     </a:solidFill>
@@ -10357,7 +10369,7 @@
               </a:ln>
               <a:extLst>
                 <a:ext uri="{91240B29-F687-4f45-9708-019B960494DF}">
-                  <a14:hiddenLine xmlns:a14="http://schemas.microsoft.com/office/drawing/2010/main" xmlns="" w="9525">
+                  <a14:hiddenLine xmlns="" xmlns:a14="http://schemas.microsoft.com/office/drawing/2010/main" w="9525">
                     <a:solidFill>
                       <a:srgbClr val="000000"/>
                     </a:solidFill>
@@ -10419,7 +10431,7 @@
               </a:ln>
               <a:extLst>
                 <a:ext uri="{91240B29-F687-4f45-9708-019B960494DF}">
-                  <a14:hiddenLine xmlns:a14="http://schemas.microsoft.com/office/drawing/2010/main" xmlns="" w="9525">
+                  <a14:hiddenLine xmlns="" xmlns:a14="http://schemas.microsoft.com/office/drawing/2010/main" w="9525">
                     <a:solidFill>
                       <a:srgbClr val="000000"/>
                     </a:solidFill>
@@ -10509,7 +10521,7 @@
               </a:ln>
               <a:extLst>
                 <a:ext uri="{91240B29-F687-4f45-9708-019B960494DF}">
-                  <a14:hiddenLine xmlns:a14="http://schemas.microsoft.com/office/drawing/2010/main" xmlns="" w="9525">
+                  <a14:hiddenLine xmlns="" xmlns:a14="http://schemas.microsoft.com/office/drawing/2010/main" w="9525">
                     <a:solidFill>
                       <a:srgbClr val="000000"/>
                     </a:solidFill>
@@ -10574,7 +10586,7 @@
               </a:ln>
               <a:extLst>
                 <a:ext uri="{91240B29-F687-4f45-9708-019B960494DF}">
-                  <a14:hiddenLine xmlns:a14="http://schemas.microsoft.com/office/drawing/2010/main" xmlns="" w="9525">
+                  <a14:hiddenLine xmlns="" xmlns:a14="http://schemas.microsoft.com/office/drawing/2010/main" w="9525">
                     <a:solidFill>
                       <a:srgbClr val="000000"/>
                     </a:solidFill>
@@ -10636,7 +10648,7 @@
               </a:ln>
               <a:extLst>
                 <a:ext uri="{91240B29-F687-4f45-9708-019B960494DF}">
-                  <a14:hiddenLine xmlns:a14="http://schemas.microsoft.com/office/drawing/2010/main" xmlns="" w="9525">
+                  <a14:hiddenLine xmlns="" xmlns:a14="http://schemas.microsoft.com/office/drawing/2010/main" w="9525">
                     <a:solidFill>
                       <a:srgbClr val="000000"/>
                     </a:solidFill>
@@ -10726,7 +10738,7 @@
               </a:ln>
               <a:extLst>
                 <a:ext uri="{91240B29-F687-4f45-9708-019B960494DF}">
-                  <a14:hiddenLine xmlns:a14="http://schemas.microsoft.com/office/drawing/2010/main" xmlns="" w="9525">
+                  <a14:hiddenLine xmlns="" xmlns:a14="http://schemas.microsoft.com/office/drawing/2010/main" w="9525">
                     <a:solidFill>
                       <a:srgbClr val="000000"/>
                     </a:solidFill>
@@ -10816,7 +10828,7 @@
               </a:ln>
               <a:extLst>
                 <a:ext uri="{91240B29-F687-4f45-9708-019B960494DF}">
-                  <a14:hiddenLine xmlns:a14="http://schemas.microsoft.com/office/drawing/2010/main" xmlns="" w="9525">
+                  <a14:hiddenLine xmlns="" xmlns:a14="http://schemas.microsoft.com/office/drawing/2010/main" w="9525">
                     <a:solidFill>
                       <a:srgbClr val="000000"/>
                     </a:solidFill>
@@ -10881,7 +10893,7 @@
               </a:ln>
               <a:extLst>
                 <a:ext uri="{91240B29-F687-4f45-9708-019B960494DF}">
-                  <a14:hiddenLine xmlns:a14="http://schemas.microsoft.com/office/drawing/2010/main" xmlns="" w="9525">
+                  <a14:hiddenLine xmlns="" xmlns:a14="http://schemas.microsoft.com/office/drawing/2010/main" w="9525">
                     <a:solidFill>
                       <a:srgbClr val="000000"/>
                     </a:solidFill>
@@ -11001,7 +11013,7 @@
               </a:ln>
               <a:extLst>
                 <a:ext uri="{91240B29-F687-4f45-9708-019B960494DF}">
-                  <a14:hiddenLine xmlns:a14="http://schemas.microsoft.com/office/drawing/2010/main" xmlns="" w="9525">
+                  <a14:hiddenLine xmlns="" xmlns:a14="http://schemas.microsoft.com/office/drawing/2010/main" w="9525">
                     <a:solidFill>
                       <a:srgbClr val="000000"/>
                     </a:solidFill>
@@ -11082,7 +11094,7 @@
               </a:ln>
               <a:extLst>
                 <a:ext uri="{91240B29-F687-4f45-9708-019B960494DF}">
-                  <a14:hiddenLine xmlns:a14="http://schemas.microsoft.com/office/drawing/2010/main" xmlns="" w="9525">
+                  <a14:hiddenLine xmlns="" xmlns:a14="http://schemas.microsoft.com/office/drawing/2010/main" w="9525">
                     <a:solidFill>
                       <a:srgbClr val="000000"/>
                     </a:solidFill>
@@ -11197,7 +11209,7 @@
               </a:ln>
               <a:extLst>
                 <a:ext uri="{91240B29-F687-4f45-9708-019B960494DF}">
-                  <a14:hiddenLine xmlns:a14="http://schemas.microsoft.com/office/drawing/2010/main" xmlns="" w="9525">
+                  <a14:hiddenLine xmlns="" xmlns:a14="http://schemas.microsoft.com/office/drawing/2010/main" w="9525">
                     <a:solidFill>
                       <a:srgbClr val="000000"/>
                     </a:solidFill>
@@ -11287,7 +11299,7 @@
               </a:ln>
               <a:extLst>
                 <a:ext uri="{91240B29-F687-4f45-9708-019B960494DF}">
-                  <a14:hiddenLine xmlns:a14="http://schemas.microsoft.com/office/drawing/2010/main" xmlns="" w="9525">
+                  <a14:hiddenLine xmlns="" xmlns:a14="http://schemas.microsoft.com/office/drawing/2010/main" w="9525">
                     <a:solidFill>
                       <a:srgbClr val="000000"/>
                     </a:solidFill>
@@ -11352,7 +11364,7 @@
               </a:ln>
               <a:extLst>
                 <a:ext uri="{91240B29-F687-4f45-9708-019B960494DF}">
-                  <a14:hiddenLine xmlns:a14="http://schemas.microsoft.com/office/drawing/2010/main" xmlns="" w="9525">
+                  <a14:hiddenLine xmlns="" xmlns:a14="http://schemas.microsoft.com/office/drawing/2010/main" w="9525">
                     <a:solidFill>
                       <a:srgbClr val="000000"/>
                     </a:solidFill>
@@ -11442,7 +11454,7 @@
               </a:ln>
               <a:extLst>
                 <a:ext uri="{91240B29-F687-4f45-9708-019B960494DF}">
-                  <a14:hiddenLine xmlns:a14="http://schemas.microsoft.com/office/drawing/2010/main" xmlns="" w="9525">
+                  <a14:hiddenLine xmlns="" xmlns:a14="http://schemas.microsoft.com/office/drawing/2010/main" w="9525">
                     <a:solidFill>
                       <a:srgbClr val="000000"/>
                     </a:solidFill>
@@ -11510,7 +11522,7 @@
               </a:ln>
               <a:extLst>
                 <a:ext uri="{91240B29-F687-4f45-9708-019B960494DF}">
-                  <a14:hiddenLine xmlns:a14="http://schemas.microsoft.com/office/drawing/2010/main" xmlns="" w="9525">
+                  <a14:hiddenLine xmlns="" xmlns:a14="http://schemas.microsoft.com/office/drawing/2010/main" w="9525">
                     <a:solidFill>
                       <a:srgbClr val="000000"/>
                     </a:solidFill>
@@ -11600,7 +11612,7 @@
               </a:ln>
               <a:extLst>
                 <a:ext uri="{91240B29-F687-4f45-9708-019B960494DF}">
-                  <a14:hiddenLine xmlns:a14="http://schemas.microsoft.com/office/drawing/2010/main" xmlns="" w="9525">
+                  <a14:hiddenLine xmlns="" xmlns:a14="http://schemas.microsoft.com/office/drawing/2010/main" w="9525">
                     <a:solidFill>
                       <a:srgbClr val="000000"/>
                     </a:solidFill>
@@ -11668,7 +11680,7 @@
               </a:ln>
               <a:extLst>
                 <a:ext uri="{91240B29-F687-4f45-9708-019B960494DF}">
-                  <a14:hiddenLine xmlns:a14="http://schemas.microsoft.com/office/drawing/2010/main" xmlns="" w="9525">
+                  <a14:hiddenLine xmlns="" xmlns:a14="http://schemas.microsoft.com/office/drawing/2010/main" w="9525">
                     <a:solidFill>
                       <a:srgbClr val="000000"/>
                     </a:solidFill>
@@ -11758,7 +11770,7 @@
               </a:ln>
               <a:extLst>
                 <a:ext uri="{91240B29-F687-4f45-9708-019B960494DF}">
-                  <a14:hiddenLine xmlns:a14="http://schemas.microsoft.com/office/drawing/2010/main" xmlns="" w="9525">
+                  <a14:hiddenLine xmlns="" xmlns:a14="http://schemas.microsoft.com/office/drawing/2010/main" w="9525">
                     <a:solidFill>
                       <a:srgbClr val="000000"/>
                     </a:solidFill>
@@ -11792,7 +11804,7 @@
               </a:ln>
               <a:extLst>
                 <a:ext uri="{91240B29-F687-4f45-9708-019B960494DF}">
-                  <a14:hiddenLine xmlns:a14="http://schemas.microsoft.com/office/drawing/2010/main" xmlns="" w="9525">
+                  <a14:hiddenLine xmlns="" xmlns:a14="http://schemas.microsoft.com/office/drawing/2010/main" w="9525">
                     <a:solidFill>
                       <a:srgbClr val="000000"/>
                     </a:solidFill>
@@ -11933,7 +11945,7 @@
             <a:fld id="{48A87A34-81AB-432B-8DAE-1953F412C126}" type="datetimeFigureOut">
               <a:rPr lang="en-US" dirty="0"/>
               <a:pPr/>
-              <a:t>8/29/2017</a:t>
+              <a:t>9/2/2017</a:t>
             </a:fld>
             <a:endParaRPr lang="en-US" dirty="0"/>
           </a:p>
@@ -12935,12 +12947,545 @@
               <a:t>Hint: Use the distributive law</a:t>
             </a:r>
           </a:p>
+          <a:p>
+            <a:pPr marL="0" indent="0">
+              <a:buNone/>
+            </a:pPr>
+            <a:r>
+              <a:rPr lang="en-US" dirty="0">
+                <a:sym typeface="Wingdings" panose="05000000000000000000" pitchFamily="2" charset="2"/>
+              </a:rPr>
+              <a:t>Hint: Use Identity</a:t>
+            </a:r>
+          </a:p>
         </p:txBody>
       </p:sp>
     </p:spTree>
     <p:extLst>
       <p:ext uri="{BB962C8B-B14F-4D97-AF65-F5344CB8AC3E}">
         <p14:creationId xmlns:p14="http://schemas.microsoft.com/office/powerpoint/2010/main" val="326131743"/>
+      </p:ext>
+    </p:extLst>
+  </p:cSld>
+  <p:clrMapOvr>
+    <a:masterClrMapping/>
+  </p:clrMapOvr>
+  <p:timing>
+    <p:tnLst>
+      <p:par>
+        <p:cTn id="1" dur="indefinite" restart="never" nodeType="tmRoot">
+          <p:childTnLst>
+            <p:seq concurrent="1" nextAc="seek">
+              <p:cTn id="2" dur="indefinite" nodeType="mainSeq">
+                <p:childTnLst>
+                  <p:par>
+                    <p:cTn id="3" fill="hold">
+                      <p:stCondLst>
+                        <p:cond delay="indefinite"/>
+                      </p:stCondLst>
+                      <p:childTnLst>
+                        <p:par>
+                          <p:cTn id="4" fill="hold">
+                            <p:stCondLst>
+                              <p:cond delay="0"/>
+                            </p:stCondLst>
+                            <p:childTnLst>
+                              <p:par>
+                                <p:cTn id="5" presetID="10" presetClass="entr" presetSubtype="0" fill="hold" grpId="0" nodeType="clickEffect">
+                                  <p:stCondLst>
+                                    <p:cond delay="0"/>
+                                  </p:stCondLst>
+                                  <p:childTnLst>
+                                    <p:set>
+                                      <p:cBhvr>
+                                        <p:cTn id="6" dur="1" fill="hold">
+                                          <p:stCondLst>
+                                            <p:cond delay="0"/>
+                                          </p:stCondLst>
+                                        </p:cTn>
+                                        <p:tgtEl>
+                                          <p:spTgt spid="3">
+                                            <p:txEl>
+                                              <p:pRg st="0" end="0"/>
+                                            </p:txEl>
+                                          </p:spTgt>
+                                        </p:tgtEl>
+                                        <p:attrNameLst>
+                                          <p:attrName>style.visibility</p:attrName>
+                                        </p:attrNameLst>
+                                      </p:cBhvr>
+                                      <p:to>
+                                        <p:strVal val="visible"/>
+                                      </p:to>
+                                    </p:set>
+                                    <p:animEffect transition="in" filter="fade">
+                                      <p:cBhvr>
+                                        <p:cTn id="7" dur="500"/>
+                                        <p:tgtEl>
+                                          <p:spTgt spid="3">
+                                            <p:txEl>
+                                              <p:pRg st="0" end="0"/>
+                                            </p:txEl>
+                                          </p:spTgt>
+                                        </p:tgtEl>
+                                      </p:cBhvr>
+                                    </p:animEffect>
+                                  </p:childTnLst>
+                                </p:cTn>
+                              </p:par>
+                            </p:childTnLst>
+                          </p:cTn>
+                        </p:par>
+                      </p:childTnLst>
+                    </p:cTn>
+                  </p:par>
+                  <p:par>
+                    <p:cTn id="8" fill="hold">
+                      <p:stCondLst>
+                        <p:cond delay="indefinite"/>
+                      </p:stCondLst>
+                      <p:childTnLst>
+                        <p:par>
+                          <p:cTn id="9" fill="hold">
+                            <p:stCondLst>
+                              <p:cond delay="0"/>
+                            </p:stCondLst>
+                            <p:childTnLst>
+                              <p:par>
+                                <p:cTn id="10" presetID="10" presetClass="entr" presetSubtype="0" fill="hold" grpId="0" nodeType="clickEffect">
+                                  <p:stCondLst>
+                                    <p:cond delay="0"/>
+                                  </p:stCondLst>
+                                  <p:childTnLst>
+                                    <p:set>
+                                      <p:cBhvr>
+                                        <p:cTn id="11" dur="1" fill="hold">
+                                          <p:stCondLst>
+                                            <p:cond delay="0"/>
+                                          </p:stCondLst>
+                                        </p:cTn>
+                                        <p:tgtEl>
+                                          <p:spTgt spid="3">
+                                            <p:txEl>
+                                              <p:pRg st="1" end="1"/>
+                                            </p:txEl>
+                                          </p:spTgt>
+                                        </p:tgtEl>
+                                        <p:attrNameLst>
+                                          <p:attrName>style.visibility</p:attrName>
+                                        </p:attrNameLst>
+                                      </p:cBhvr>
+                                      <p:to>
+                                        <p:strVal val="visible"/>
+                                      </p:to>
+                                    </p:set>
+                                    <p:animEffect transition="in" filter="fade">
+                                      <p:cBhvr>
+                                        <p:cTn id="12" dur="500"/>
+                                        <p:tgtEl>
+                                          <p:spTgt spid="3">
+                                            <p:txEl>
+                                              <p:pRg st="1" end="1"/>
+                                            </p:txEl>
+                                          </p:spTgt>
+                                        </p:tgtEl>
+                                      </p:cBhvr>
+                                    </p:animEffect>
+                                  </p:childTnLst>
+                                </p:cTn>
+                              </p:par>
+                            </p:childTnLst>
+                          </p:cTn>
+                        </p:par>
+                      </p:childTnLst>
+                    </p:cTn>
+                  </p:par>
+                  <p:par>
+                    <p:cTn id="13" fill="hold">
+                      <p:stCondLst>
+                        <p:cond delay="indefinite"/>
+                      </p:stCondLst>
+                      <p:childTnLst>
+                        <p:par>
+                          <p:cTn id="14" fill="hold">
+                            <p:stCondLst>
+                              <p:cond delay="0"/>
+                            </p:stCondLst>
+                            <p:childTnLst>
+                              <p:par>
+                                <p:cTn id="15" presetID="10" presetClass="entr" presetSubtype="0" fill="hold" grpId="0" nodeType="clickEffect">
+                                  <p:stCondLst>
+                                    <p:cond delay="0"/>
+                                  </p:stCondLst>
+                                  <p:childTnLst>
+                                    <p:set>
+                                      <p:cBhvr>
+                                        <p:cTn id="16" dur="1" fill="hold">
+                                          <p:stCondLst>
+                                            <p:cond delay="0"/>
+                                          </p:stCondLst>
+                                        </p:cTn>
+                                        <p:tgtEl>
+                                          <p:spTgt spid="3">
+                                            <p:txEl>
+                                              <p:pRg st="2" end="2"/>
+                                            </p:txEl>
+                                          </p:spTgt>
+                                        </p:tgtEl>
+                                        <p:attrNameLst>
+                                          <p:attrName>style.visibility</p:attrName>
+                                        </p:attrNameLst>
+                                      </p:cBhvr>
+                                      <p:to>
+                                        <p:strVal val="visible"/>
+                                      </p:to>
+                                    </p:set>
+                                    <p:animEffect transition="in" filter="fade">
+                                      <p:cBhvr>
+                                        <p:cTn id="17" dur="500"/>
+                                        <p:tgtEl>
+                                          <p:spTgt spid="3">
+                                            <p:txEl>
+                                              <p:pRg st="2" end="2"/>
+                                            </p:txEl>
+                                          </p:spTgt>
+                                        </p:tgtEl>
+                                      </p:cBhvr>
+                                    </p:animEffect>
+                                  </p:childTnLst>
+                                </p:cTn>
+                              </p:par>
+                            </p:childTnLst>
+                          </p:cTn>
+                        </p:par>
+                      </p:childTnLst>
+                    </p:cTn>
+                  </p:par>
+                  <p:par>
+                    <p:cTn id="18" fill="hold">
+                      <p:stCondLst>
+                        <p:cond delay="indefinite"/>
+                      </p:stCondLst>
+                      <p:childTnLst>
+                        <p:par>
+                          <p:cTn id="19" fill="hold">
+                            <p:stCondLst>
+                              <p:cond delay="0"/>
+                            </p:stCondLst>
+                            <p:childTnLst>
+                              <p:par>
+                                <p:cTn id="20" presetID="10" presetClass="entr" presetSubtype="0" fill="hold" grpId="0" nodeType="clickEffect">
+                                  <p:stCondLst>
+                                    <p:cond delay="0"/>
+                                  </p:stCondLst>
+                                  <p:childTnLst>
+                                    <p:set>
+                                      <p:cBhvr>
+                                        <p:cTn id="21" dur="1" fill="hold">
+                                          <p:stCondLst>
+                                            <p:cond delay="0"/>
+                                          </p:stCondLst>
+                                        </p:cTn>
+                                        <p:tgtEl>
+                                          <p:spTgt spid="3">
+                                            <p:txEl>
+                                              <p:pRg st="3" end="3"/>
+                                            </p:txEl>
+                                          </p:spTgt>
+                                        </p:tgtEl>
+                                        <p:attrNameLst>
+                                          <p:attrName>style.visibility</p:attrName>
+                                        </p:attrNameLst>
+                                      </p:cBhvr>
+                                      <p:to>
+                                        <p:strVal val="visible"/>
+                                      </p:to>
+                                    </p:set>
+                                    <p:animEffect transition="in" filter="fade">
+                                      <p:cBhvr>
+                                        <p:cTn id="22" dur="500"/>
+                                        <p:tgtEl>
+                                          <p:spTgt spid="3">
+                                            <p:txEl>
+                                              <p:pRg st="3" end="3"/>
+                                            </p:txEl>
+                                          </p:spTgt>
+                                        </p:tgtEl>
+                                      </p:cBhvr>
+                                    </p:animEffect>
+                                  </p:childTnLst>
+                                </p:cTn>
+                              </p:par>
+                            </p:childTnLst>
+                          </p:cTn>
+                        </p:par>
+                      </p:childTnLst>
+                    </p:cTn>
+                  </p:par>
+                  <p:par>
+                    <p:cTn id="23" fill="hold">
+                      <p:stCondLst>
+                        <p:cond delay="indefinite"/>
+                      </p:stCondLst>
+                      <p:childTnLst>
+                        <p:par>
+                          <p:cTn id="24" fill="hold">
+                            <p:stCondLst>
+                              <p:cond delay="0"/>
+                            </p:stCondLst>
+                            <p:childTnLst>
+                              <p:par>
+                                <p:cTn id="25" presetID="10" presetClass="entr" presetSubtype="0" fill="hold" grpId="0" nodeType="clickEffect">
+                                  <p:stCondLst>
+                                    <p:cond delay="0"/>
+                                  </p:stCondLst>
+                                  <p:childTnLst>
+                                    <p:set>
+                                      <p:cBhvr>
+                                        <p:cTn id="26" dur="1" fill="hold">
+                                          <p:stCondLst>
+                                            <p:cond delay="0"/>
+                                          </p:stCondLst>
+                                        </p:cTn>
+                                        <p:tgtEl>
+                                          <p:spTgt spid="3">
+                                            <p:txEl>
+                                              <p:pRg st="4" end="4"/>
+                                            </p:txEl>
+                                          </p:spTgt>
+                                        </p:tgtEl>
+                                        <p:attrNameLst>
+                                          <p:attrName>style.visibility</p:attrName>
+                                        </p:attrNameLst>
+                                      </p:cBhvr>
+                                      <p:to>
+                                        <p:strVal val="visible"/>
+                                      </p:to>
+                                    </p:set>
+                                    <p:animEffect transition="in" filter="fade">
+                                      <p:cBhvr>
+                                        <p:cTn id="27" dur="500"/>
+                                        <p:tgtEl>
+                                          <p:spTgt spid="3">
+                                            <p:txEl>
+                                              <p:pRg st="4" end="4"/>
+                                            </p:txEl>
+                                          </p:spTgt>
+                                        </p:tgtEl>
+                                      </p:cBhvr>
+                                    </p:animEffect>
+                                  </p:childTnLst>
+                                </p:cTn>
+                              </p:par>
+                            </p:childTnLst>
+                          </p:cTn>
+                        </p:par>
+                      </p:childTnLst>
+                    </p:cTn>
+                  </p:par>
+                  <p:par>
+                    <p:cTn id="28" fill="hold">
+                      <p:stCondLst>
+                        <p:cond delay="indefinite"/>
+                      </p:stCondLst>
+                      <p:childTnLst>
+                        <p:par>
+                          <p:cTn id="29" fill="hold">
+                            <p:stCondLst>
+                              <p:cond delay="0"/>
+                            </p:stCondLst>
+                            <p:childTnLst>
+                              <p:par>
+                                <p:cTn id="30" presetID="10" presetClass="entr" presetSubtype="0" fill="hold" grpId="0" nodeType="clickEffect">
+                                  <p:stCondLst>
+                                    <p:cond delay="0"/>
+                                  </p:stCondLst>
+                                  <p:childTnLst>
+                                    <p:set>
+                                      <p:cBhvr>
+                                        <p:cTn id="31" dur="1" fill="hold">
+                                          <p:stCondLst>
+                                            <p:cond delay="0"/>
+                                          </p:stCondLst>
+                                        </p:cTn>
+                                        <p:tgtEl>
+                                          <p:spTgt spid="3">
+                                            <p:txEl>
+                                              <p:pRg st="5" end="5"/>
+                                            </p:txEl>
+                                          </p:spTgt>
+                                        </p:tgtEl>
+                                        <p:attrNameLst>
+                                          <p:attrName>style.visibility</p:attrName>
+                                        </p:attrNameLst>
+                                      </p:cBhvr>
+                                      <p:to>
+                                        <p:strVal val="visible"/>
+                                      </p:to>
+                                    </p:set>
+                                    <p:animEffect transition="in" filter="fade">
+                                      <p:cBhvr>
+                                        <p:cTn id="32" dur="500"/>
+                                        <p:tgtEl>
+                                          <p:spTgt spid="3">
+                                            <p:txEl>
+                                              <p:pRg st="5" end="5"/>
+                                            </p:txEl>
+                                          </p:spTgt>
+                                        </p:tgtEl>
+                                      </p:cBhvr>
+                                    </p:animEffect>
+                                  </p:childTnLst>
+                                </p:cTn>
+                              </p:par>
+                            </p:childTnLst>
+                          </p:cTn>
+                        </p:par>
+                      </p:childTnLst>
+                    </p:cTn>
+                  </p:par>
+                </p:childTnLst>
+              </p:cTn>
+              <p:prevCondLst>
+                <p:cond evt="onPrev" delay="0">
+                  <p:tgtEl>
+                    <p:sldTgt/>
+                  </p:tgtEl>
+                </p:cond>
+              </p:prevCondLst>
+              <p:nextCondLst>
+                <p:cond evt="onNext" delay="0">
+                  <p:tgtEl>
+                    <p:sldTgt/>
+                  </p:tgtEl>
+                </p:cond>
+              </p:nextCondLst>
+            </p:seq>
+          </p:childTnLst>
+        </p:cTn>
+      </p:par>
+    </p:tnLst>
+    <p:bldLst>
+      <p:bldP spid="3" grpId="0" uiExpand="1" build="p"/>
+    </p:bldLst>
+  </p:timing>
+</p:sld>
+</file>
+
+<file path=ppt/slides/slide12.xml><?xml version="1.0" encoding="utf-8"?>
+<p:sld xmlns:a="http://schemas.openxmlformats.org/drawingml/2006/main" xmlns:r="http://schemas.openxmlformats.org/officeDocument/2006/relationships" xmlns:p="http://schemas.openxmlformats.org/presentationml/2006/main">
+  <p:cSld>
+    <p:spTree>
+      <p:nvGrpSpPr>
+        <p:cNvPr id="1" name=""/>
+        <p:cNvGrpSpPr/>
+        <p:nvPr/>
+      </p:nvGrpSpPr>
+      <p:grpSpPr>
+        <a:xfrm>
+          <a:off x="0" y="0"/>
+          <a:ext cx="0" cy="0"/>
+          <a:chOff x="0" y="0"/>
+          <a:chExt cx="0" cy="0"/>
+        </a:xfrm>
+      </p:grpSpPr>
+      <p:sp>
+        <p:nvSpPr>
+          <p:cNvPr id="2" name="Title 1">
+            <a:extLst>
+              <a:ext uri="{FF2B5EF4-FFF2-40B4-BE49-F238E27FC236}">
+                <a16:creationId xmlns:a16="http://schemas.microsoft.com/office/drawing/2014/main" id="{4C1A2DA9-047D-46A5-AD56-689A954EF28E}"/>
+              </a:ext>
+            </a:extLst>
+          </p:cNvPr>
+          <p:cNvSpPr>
+            <a:spLocks noGrp="1"/>
+          </p:cNvSpPr>
+          <p:nvPr>
+            <p:ph type="title"/>
+          </p:nvPr>
+        </p:nvSpPr>
+        <p:spPr/>
+        <p:txBody>
+          <a:bodyPr/>
+          <a:lstStyle/>
+          <a:p>
+            <a:r>
+              <a:rPr lang="en-US" dirty="0"/>
+              <a:t>Challenge</a:t>
+            </a:r>
+          </a:p>
+        </p:txBody>
+      </p:sp>
+      <p:sp>
+        <p:nvSpPr>
+          <p:cNvPr id="3" name="Content Placeholder 2">
+            <a:extLst>
+              <a:ext uri="{FF2B5EF4-FFF2-40B4-BE49-F238E27FC236}">
+                <a16:creationId xmlns:a16="http://schemas.microsoft.com/office/drawing/2014/main" id="{AA9348E1-F3A3-4B45-A9FF-3978A274A89C}"/>
+              </a:ext>
+            </a:extLst>
+          </p:cNvPr>
+          <p:cNvSpPr>
+            <a:spLocks noGrp="1"/>
+          </p:cNvSpPr>
+          <p:nvPr>
+            <p:ph idx="1"/>
+          </p:nvPr>
+        </p:nvSpPr>
+        <p:spPr/>
+        <p:txBody>
+          <a:bodyPr/>
+          <a:lstStyle/>
+          <a:p>
+            <a:r>
+              <a:rPr lang="en-US" dirty="0"/>
+              <a:t>Reduce [(P^Q) -&gt; R]’ down as far as you can</a:t>
+            </a:r>
+          </a:p>
+          <a:p>
+            <a:r>
+              <a:rPr lang="en-US" dirty="0"/>
+              <a:t>[(P^Q) -&gt; R]’</a:t>
+            </a:r>
+          </a:p>
+          <a:p>
+            <a:r>
+              <a:rPr lang="en-US" dirty="0"/>
+              <a:t>[(P^Q)’ v R]’		Implication</a:t>
+            </a:r>
+          </a:p>
+          <a:p>
+            <a:r>
+              <a:rPr lang="en-US" dirty="0"/>
+              <a:t>(P ^ Q)’’ ^ R’		</a:t>
+            </a:r>
+            <a:r>
+              <a:rPr lang="en-US" dirty="0" err="1"/>
+              <a:t>DeM</a:t>
+            </a:r>
+            <a:endParaRPr lang="en-US" dirty="0"/>
+          </a:p>
+          <a:p>
+            <a:r>
+              <a:rPr lang="en-US" dirty="0"/>
+              <a:t>P ^ Q ^ R		</a:t>
+            </a:r>
+            <a:r>
+              <a:rPr lang="en-US" dirty="0" err="1"/>
+              <a:t>DNeg</a:t>
+            </a:r>
+            <a:endParaRPr lang="en-US" dirty="0"/>
+          </a:p>
+          <a:p>
+            <a:endParaRPr lang="en-US" dirty="0"/>
+          </a:p>
+        </p:txBody>
+      </p:sp>
+    </p:spTree>
+    <p:extLst>
+      <p:ext uri="{BB962C8B-B14F-4D97-AF65-F5344CB8AC3E}">
+        <p14:creationId xmlns:p14="http://schemas.microsoft.com/office/powerpoint/2010/main" val="924507186"/>
       </p:ext>
     </p:extLst>
   </p:cSld>
@@ -13282,9 +13827,682 @@
       </p:par>
     </p:tnLst>
     <p:bldLst>
-      <p:bldP spid="3" grpId="0" uiExpand="1" build="p"/>
+      <p:bldP spid="3" grpId="0" build="p"/>
     </p:bldLst>
   </p:timing>
+</p:sld>
+</file>
+
+<file path=ppt/slides/slide13.xml><?xml version="1.0" encoding="utf-8"?>
+<p:sld xmlns:a="http://schemas.openxmlformats.org/drawingml/2006/main" xmlns:r="http://schemas.openxmlformats.org/officeDocument/2006/relationships" xmlns:p="http://schemas.openxmlformats.org/presentationml/2006/main">
+  <p:cSld>
+    <p:spTree>
+      <p:nvGrpSpPr>
+        <p:cNvPr id="1" name=""/>
+        <p:cNvGrpSpPr/>
+        <p:nvPr/>
+      </p:nvGrpSpPr>
+      <p:grpSpPr>
+        <a:xfrm>
+          <a:off x="0" y="0"/>
+          <a:ext cx="0" cy="0"/>
+          <a:chOff x="0" y="0"/>
+          <a:chExt cx="0" cy="0"/>
+        </a:xfrm>
+      </p:grpSpPr>
+      <p:sp>
+        <p:nvSpPr>
+          <p:cNvPr id="2" name="Title 1">
+            <a:extLst>
+              <a:ext uri="{FF2B5EF4-FFF2-40B4-BE49-F238E27FC236}">
+                <a16:creationId xmlns:a16="http://schemas.microsoft.com/office/drawing/2014/main" id="{190CA1BC-1AF0-4740-91E9-010F6C60E73C}"/>
+              </a:ext>
+            </a:extLst>
+          </p:cNvPr>
+          <p:cNvSpPr>
+            <a:spLocks noGrp="1"/>
+          </p:cNvSpPr>
+          <p:nvPr>
+            <p:ph type="title"/>
+          </p:nvPr>
+        </p:nvSpPr>
+        <p:spPr/>
+        <p:txBody>
+          <a:bodyPr/>
+          <a:lstStyle/>
+          <a:p>
+            <a:r>
+              <a:rPr lang="en-US" dirty="0"/>
+              <a:t>Challenge 2</a:t>
+            </a:r>
+          </a:p>
+        </p:txBody>
+      </p:sp>
+      <p:sp>
+        <p:nvSpPr>
+          <p:cNvPr id="3" name="Content Placeholder 2">
+            <a:extLst>
+              <a:ext uri="{FF2B5EF4-FFF2-40B4-BE49-F238E27FC236}">
+                <a16:creationId xmlns:a16="http://schemas.microsoft.com/office/drawing/2014/main" id="{98FC1238-0611-481A-AB90-E0835F6ADC93}"/>
+              </a:ext>
+            </a:extLst>
+          </p:cNvPr>
+          <p:cNvSpPr>
+            <a:spLocks noGrp="1"/>
+          </p:cNvSpPr>
+          <p:nvPr>
+            <p:ph idx="1"/>
+          </p:nvPr>
+        </p:nvSpPr>
+        <p:spPr/>
+        <p:txBody>
+          <a:bodyPr/>
+          <a:lstStyle/>
+          <a:p>
+            <a:r>
+              <a:rPr lang="en-US" dirty="0"/>
+              <a:t>Prove (P’ v Q) ^ (P ^ (P ^ Q)) </a:t>
+            </a:r>
+            <a:r>
+              <a:rPr lang="en-US" dirty="0">
+                <a:sym typeface="Wingdings" panose="05000000000000000000" pitchFamily="2" charset="2"/>
+              </a:rPr>
+              <a:t> (P ^ Q)</a:t>
+            </a:r>
+          </a:p>
+          <a:p>
+            <a:r>
+              <a:rPr lang="en-US" dirty="0"/>
+              <a:t>(P’ v Q) ^ (P ^ Q) </a:t>
+            </a:r>
+            <a:r>
+              <a:rPr lang="en-US" dirty="0">
+                <a:sym typeface="Wingdings" panose="05000000000000000000" pitchFamily="2" charset="2"/>
+              </a:rPr>
+              <a:t> (P ^ Q)		</a:t>
+            </a:r>
+            <a:r>
+              <a:rPr lang="en-US" dirty="0"/>
+              <a:t>IDENTITY</a:t>
+            </a:r>
+            <a:endParaRPr lang="en-US" dirty="0">
+              <a:sym typeface="Wingdings" panose="05000000000000000000" pitchFamily="2" charset="2"/>
+            </a:endParaRPr>
+          </a:p>
+          <a:p>
+            <a:r>
+              <a:rPr lang="en-US" dirty="0">
+                <a:sym typeface="Wingdings" panose="05000000000000000000" pitchFamily="2" charset="2"/>
+              </a:rPr>
+              <a:t>(P’ ^ P ^ Q) v (Q ^ P ^ Q)  (P ^ Q)	DISTRIBUTION	</a:t>
+            </a:r>
+            <a:r>
+              <a:rPr lang="en-US" dirty="0"/>
+              <a:t>		</a:t>
+            </a:r>
+            <a:endParaRPr lang="en-US" dirty="0">
+              <a:sym typeface="Wingdings" panose="05000000000000000000" pitchFamily="2" charset="2"/>
+            </a:endParaRPr>
+          </a:p>
+          <a:p>
+            <a:r>
+              <a:rPr lang="en-US" dirty="0"/>
+              <a:t>(F ^ Q) v (P ^ Q) </a:t>
+            </a:r>
+            <a:r>
+              <a:rPr lang="en-US" dirty="0">
+                <a:sym typeface="Wingdings" panose="05000000000000000000" pitchFamily="2" charset="2"/>
+              </a:rPr>
+              <a:t> (P ^ Q)</a:t>
+            </a:r>
+          </a:p>
+          <a:p>
+            <a:r>
+              <a:rPr lang="en-US" dirty="0">
+                <a:sym typeface="Wingdings" panose="05000000000000000000" pitchFamily="2" charset="2"/>
+              </a:rPr>
+              <a:t>F v (P ^ Q)  (P ^ Q)			DOMINATION</a:t>
+            </a:r>
+          </a:p>
+          <a:p>
+            <a:r>
+              <a:rPr lang="en-US" dirty="0">
+                <a:sym typeface="Wingdings" panose="05000000000000000000" pitchFamily="2" charset="2"/>
+              </a:rPr>
+              <a:t>(P ^ Q)  (P ^ Q)				IDENTITY</a:t>
+            </a:r>
+            <a:endParaRPr lang="en-US" dirty="0"/>
+          </a:p>
+        </p:txBody>
+      </p:sp>
+    </p:spTree>
+    <p:extLst>
+      <p:ext uri="{BB962C8B-B14F-4D97-AF65-F5344CB8AC3E}">
+        <p14:creationId xmlns:p14="http://schemas.microsoft.com/office/powerpoint/2010/main" val="1573468580"/>
+      </p:ext>
+    </p:extLst>
+  </p:cSld>
+  <p:clrMapOvr>
+    <a:masterClrMapping/>
+  </p:clrMapOvr>
+  <p:timing>
+    <p:tnLst>
+      <p:par>
+        <p:cTn id="1" dur="indefinite" restart="never" nodeType="tmRoot">
+          <p:childTnLst>
+            <p:seq concurrent="1" nextAc="seek">
+              <p:cTn id="2" dur="indefinite" nodeType="mainSeq">
+                <p:childTnLst>
+                  <p:par>
+                    <p:cTn id="3" fill="hold">
+                      <p:stCondLst>
+                        <p:cond delay="indefinite"/>
+                      </p:stCondLst>
+                      <p:childTnLst>
+                        <p:par>
+                          <p:cTn id="4" fill="hold">
+                            <p:stCondLst>
+                              <p:cond delay="0"/>
+                            </p:stCondLst>
+                            <p:childTnLst>
+                              <p:par>
+                                <p:cTn id="5" presetID="10" presetClass="entr" presetSubtype="0" fill="hold" grpId="0" nodeType="clickEffect">
+                                  <p:stCondLst>
+                                    <p:cond delay="0"/>
+                                  </p:stCondLst>
+                                  <p:childTnLst>
+                                    <p:set>
+                                      <p:cBhvr>
+                                        <p:cTn id="6" dur="1" fill="hold">
+                                          <p:stCondLst>
+                                            <p:cond delay="0"/>
+                                          </p:stCondLst>
+                                        </p:cTn>
+                                        <p:tgtEl>
+                                          <p:spTgt spid="3">
+                                            <p:txEl>
+                                              <p:pRg st="0" end="0"/>
+                                            </p:txEl>
+                                          </p:spTgt>
+                                        </p:tgtEl>
+                                        <p:attrNameLst>
+                                          <p:attrName>style.visibility</p:attrName>
+                                        </p:attrNameLst>
+                                      </p:cBhvr>
+                                      <p:to>
+                                        <p:strVal val="visible"/>
+                                      </p:to>
+                                    </p:set>
+                                    <p:animEffect transition="in" filter="fade">
+                                      <p:cBhvr>
+                                        <p:cTn id="7" dur="500"/>
+                                        <p:tgtEl>
+                                          <p:spTgt spid="3">
+                                            <p:txEl>
+                                              <p:pRg st="0" end="0"/>
+                                            </p:txEl>
+                                          </p:spTgt>
+                                        </p:tgtEl>
+                                      </p:cBhvr>
+                                    </p:animEffect>
+                                  </p:childTnLst>
+                                </p:cTn>
+                              </p:par>
+                            </p:childTnLst>
+                          </p:cTn>
+                        </p:par>
+                      </p:childTnLst>
+                    </p:cTn>
+                  </p:par>
+                  <p:par>
+                    <p:cTn id="8" fill="hold">
+                      <p:stCondLst>
+                        <p:cond delay="indefinite"/>
+                      </p:stCondLst>
+                      <p:childTnLst>
+                        <p:par>
+                          <p:cTn id="9" fill="hold">
+                            <p:stCondLst>
+                              <p:cond delay="0"/>
+                            </p:stCondLst>
+                            <p:childTnLst>
+                              <p:par>
+                                <p:cTn id="10" presetID="10" presetClass="entr" presetSubtype="0" fill="hold" grpId="0" nodeType="clickEffect">
+                                  <p:stCondLst>
+                                    <p:cond delay="0"/>
+                                  </p:stCondLst>
+                                  <p:childTnLst>
+                                    <p:set>
+                                      <p:cBhvr>
+                                        <p:cTn id="11" dur="1" fill="hold">
+                                          <p:stCondLst>
+                                            <p:cond delay="0"/>
+                                          </p:stCondLst>
+                                        </p:cTn>
+                                        <p:tgtEl>
+                                          <p:spTgt spid="3">
+                                            <p:txEl>
+                                              <p:pRg st="1" end="1"/>
+                                            </p:txEl>
+                                          </p:spTgt>
+                                        </p:tgtEl>
+                                        <p:attrNameLst>
+                                          <p:attrName>style.visibility</p:attrName>
+                                        </p:attrNameLst>
+                                      </p:cBhvr>
+                                      <p:to>
+                                        <p:strVal val="visible"/>
+                                      </p:to>
+                                    </p:set>
+                                    <p:animEffect transition="in" filter="fade">
+                                      <p:cBhvr>
+                                        <p:cTn id="12" dur="500"/>
+                                        <p:tgtEl>
+                                          <p:spTgt spid="3">
+                                            <p:txEl>
+                                              <p:pRg st="1" end="1"/>
+                                            </p:txEl>
+                                          </p:spTgt>
+                                        </p:tgtEl>
+                                      </p:cBhvr>
+                                    </p:animEffect>
+                                  </p:childTnLst>
+                                </p:cTn>
+                              </p:par>
+                            </p:childTnLst>
+                          </p:cTn>
+                        </p:par>
+                      </p:childTnLst>
+                    </p:cTn>
+                  </p:par>
+                  <p:par>
+                    <p:cTn id="13" fill="hold">
+                      <p:stCondLst>
+                        <p:cond delay="indefinite"/>
+                      </p:stCondLst>
+                      <p:childTnLst>
+                        <p:par>
+                          <p:cTn id="14" fill="hold">
+                            <p:stCondLst>
+                              <p:cond delay="0"/>
+                            </p:stCondLst>
+                            <p:childTnLst>
+                              <p:par>
+                                <p:cTn id="15" presetID="10" presetClass="entr" presetSubtype="0" fill="hold" grpId="0" nodeType="clickEffect">
+                                  <p:stCondLst>
+                                    <p:cond delay="0"/>
+                                  </p:stCondLst>
+                                  <p:childTnLst>
+                                    <p:set>
+                                      <p:cBhvr>
+                                        <p:cTn id="16" dur="1" fill="hold">
+                                          <p:stCondLst>
+                                            <p:cond delay="0"/>
+                                          </p:stCondLst>
+                                        </p:cTn>
+                                        <p:tgtEl>
+                                          <p:spTgt spid="3">
+                                            <p:txEl>
+                                              <p:pRg st="2" end="2"/>
+                                            </p:txEl>
+                                          </p:spTgt>
+                                        </p:tgtEl>
+                                        <p:attrNameLst>
+                                          <p:attrName>style.visibility</p:attrName>
+                                        </p:attrNameLst>
+                                      </p:cBhvr>
+                                      <p:to>
+                                        <p:strVal val="visible"/>
+                                      </p:to>
+                                    </p:set>
+                                    <p:animEffect transition="in" filter="fade">
+                                      <p:cBhvr>
+                                        <p:cTn id="17" dur="500"/>
+                                        <p:tgtEl>
+                                          <p:spTgt spid="3">
+                                            <p:txEl>
+                                              <p:pRg st="2" end="2"/>
+                                            </p:txEl>
+                                          </p:spTgt>
+                                        </p:tgtEl>
+                                      </p:cBhvr>
+                                    </p:animEffect>
+                                  </p:childTnLst>
+                                </p:cTn>
+                              </p:par>
+                            </p:childTnLst>
+                          </p:cTn>
+                        </p:par>
+                      </p:childTnLst>
+                    </p:cTn>
+                  </p:par>
+                  <p:par>
+                    <p:cTn id="18" fill="hold">
+                      <p:stCondLst>
+                        <p:cond delay="indefinite"/>
+                      </p:stCondLst>
+                      <p:childTnLst>
+                        <p:par>
+                          <p:cTn id="19" fill="hold">
+                            <p:stCondLst>
+                              <p:cond delay="0"/>
+                            </p:stCondLst>
+                            <p:childTnLst>
+                              <p:par>
+                                <p:cTn id="20" presetID="10" presetClass="entr" presetSubtype="0" fill="hold" grpId="0" nodeType="clickEffect">
+                                  <p:stCondLst>
+                                    <p:cond delay="0"/>
+                                  </p:stCondLst>
+                                  <p:childTnLst>
+                                    <p:set>
+                                      <p:cBhvr>
+                                        <p:cTn id="21" dur="1" fill="hold">
+                                          <p:stCondLst>
+                                            <p:cond delay="0"/>
+                                          </p:stCondLst>
+                                        </p:cTn>
+                                        <p:tgtEl>
+                                          <p:spTgt spid="3">
+                                            <p:txEl>
+                                              <p:pRg st="3" end="3"/>
+                                            </p:txEl>
+                                          </p:spTgt>
+                                        </p:tgtEl>
+                                        <p:attrNameLst>
+                                          <p:attrName>style.visibility</p:attrName>
+                                        </p:attrNameLst>
+                                      </p:cBhvr>
+                                      <p:to>
+                                        <p:strVal val="visible"/>
+                                      </p:to>
+                                    </p:set>
+                                    <p:animEffect transition="in" filter="fade">
+                                      <p:cBhvr>
+                                        <p:cTn id="22" dur="500"/>
+                                        <p:tgtEl>
+                                          <p:spTgt spid="3">
+                                            <p:txEl>
+                                              <p:pRg st="3" end="3"/>
+                                            </p:txEl>
+                                          </p:spTgt>
+                                        </p:tgtEl>
+                                      </p:cBhvr>
+                                    </p:animEffect>
+                                  </p:childTnLst>
+                                </p:cTn>
+                              </p:par>
+                            </p:childTnLst>
+                          </p:cTn>
+                        </p:par>
+                      </p:childTnLst>
+                    </p:cTn>
+                  </p:par>
+                  <p:par>
+                    <p:cTn id="23" fill="hold">
+                      <p:stCondLst>
+                        <p:cond delay="indefinite"/>
+                      </p:stCondLst>
+                      <p:childTnLst>
+                        <p:par>
+                          <p:cTn id="24" fill="hold">
+                            <p:stCondLst>
+                              <p:cond delay="0"/>
+                            </p:stCondLst>
+                            <p:childTnLst>
+                              <p:par>
+                                <p:cTn id="25" presetID="10" presetClass="entr" presetSubtype="0" fill="hold" grpId="0" nodeType="clickEffect">
+                                  <p:stCondLst>
+                                    <p:cond delay="0"/>
+                                  </p:stCondLst>
+                                  <p:childTnLst>
+                                    <p:set>
+                                      <p:cBhvr>
+                                        <p:cTn id="26" dur="1" fill="hold">
+                                          <p:stCondLst>
+                                            <p:cond delay="0"/>
+                                          </p:stCondLst>
+                                        </p:cTn>
+                                        <p:tgtEl>
+                                          <p:spTgt spid="3">
+                                            <p:txEl>
+                                              <p:pRg st="4" end="4"/>
+                                            </p:txEl>
+                                          </p:spTgt>
+                                        </p:tgtEl>
+                                        <p:attrNameLst>
+                                          <p:attrName>style.visibility</p:attrName>
+                                        </p:attrNameLst>
+                                      </p:cBhvr>
+                                      <p:to>
+                                        <p:strVal val="visible"/>
+                                      </p:to>
+                                    </p:set>
+                                    <p:animEffect transition="in" filter="fade">
+                                      <p:cBhvr>
+                                        <p:cTn id="27" dur="500"/>
+                                        <p:tgtEl>
+                                          <p:spTgt spid="3">
+                                            <p:txEl>
+                                              <p:pRg st="4" end="4"/>
+                                            </p:txEl>
+                                          </p:spTgt>
+                                        </p:tgtEl>
+                                      </p:cBhvr>
+                                    </p:animEffect>
+                                  </p:childTnLst>
+                                </p:cTn>
+                              </p:par>
+                            </p:childTnLst>
+                          </p:cTn>
+                        </p:par>
+                      </p:childTnLst>
+                    </p:cTn>
+                  </p:par>
+                  <p:par>
+                    <p:cTn id="28" fill="hold">
+                      <p:stCondLst>
+                        <p:cond delay="indefinite"/>
+                      </p:stCondLst>
+                      <p:childTnLst>
+                        <p:par>
+                          <p:cTn id="29" fill="hold">
+                            <p:stCondLst>
+                              <p:cond delay="0"/>
+                            </p:stCondLst>
+                            <p:childTnLst>
+                              <p:par>
+                                <p:cTn id="30" presetID="10" presetClass="entr" presetSubtype="0" fill="hold" grpId="0" nodeType="clickEffect">
+                                  <p:stCondLst>
+                                    <p:cond delay="0"/>
+                                  </p:stCondLst>
+                                  <p:childTnLst>
+                                    <p:set>
+                                      <p:cBhvr>
+                                        <p:cTn id="31" dur="1" fill="hold">
+                                          <p:stCondLst>
+                                            <p:cond delay="0"/>
+                                          </p:stCondLst>
+                                        </p:cTn>
+                                        <p:tgtEl>
+                                          <p:spTgt spid="3">
+                                            <p:txEl>
+                                              <p:pRg st="5" end="5"/>
+                                            </p:txEl>
+                                          </p:spTgt>
+                                        </p:tgtEl>
+                                        <p:attrNameLst>
+                                          <p:attrName>style.visibility</p:attrName>
+                                        </p:attrNameLst>
+                                      </p:cBhvr>
+                                      <p:to>
+                                        <p:strVal val="visible"/>
+                                      </p:to>
+                                    </p:set>
+                                    <p:animEffect transition="in" filter="fade">
+                                      <p:cBhvr>
+                                        <p:cTn id="32" dur="500"/>
+                                        <p:tgtEl>
+                                          <p:spTgt spid="3">
+                                            <p:txEl>
+                                              <p:pRg st="5" end="5"/>
+                                            </p:txEl>
+                                          </p:spTgt>
+                                        </p:tgtEl>
+                                      </p:cBhvr>
+                                    </p:animEffect>
+                                  </p:childTnLst>
+                                </p:cTn>
+                              </p:par>
+                            </p:childTnLst>
+                          </p:cTn>
+                        </p:par>
+                      </p:childTnLst>
+                    </p:cTn>
+                  </p:par>
+                </p:childTnLst>
+              </p:cTn>
+              <p:prevCondLst>
+                <p:cond evt="onPrev" delay="0">
+                  <p:tgtEl>
+                    <p:sldTgt/>
+                  </p:tgtEl>
+                </p:cond>
+              </p:prevCondLst>
+              <p:nextCondLst>
+                <p:cond evt="onNext" delay="0">
+                  <p:tgtEl>
+                    <p:sldTgt/>
+                  </p:tgtEl>
+                </p:cond>
+              </p:nextCondLst>
+            </p:seq>
+          </p:childTnLst>
+        </p:cTn>
+      </p:par>
+    </p:tnLst>
+    <p:bldLst>
+      <p:bldP spid="3" grpId="0" build="p"/>
+    </p:bldLst>
+  </p:timing>
+</p:sld>
+</file>
+
+<file path=ppt/slides/slide14.xml><?xml version="1.0" encoding="utf-8"?>
+<p:sld xmlns:a="http://schemas.openxmlformats.org/drawingml/2006/main" xmlns:r="http://schemas.openxmlformats.org/officeDocument/2006/relationships" xmlns:p="http://schemas.openxmlformats.org/presentationml/2006/main">
+  <p:cSld>
+    <p:spTree>
+      <p:nvGrpSpPr>
+        <p:cNvPr id="1" name=""/>
+        <p:cNvGrpSpPr/>
+        <p:nvPr/>
+      </p:nvGrpSpPr>
+      <p:grpSpPr>
+        <a:xfrm>
+          <a:off x="0" y="0"/>
+          <a:ext cx="0" cy="0"/>
+          <a:chOff x="0" y="0"/>
+          <a:chExt cx="0" cy="0"/>
+        </a:xfrm>
+      </p:grpSpPr>
+      <p:sp>
+        <p:nvSpPr>
+          <p:cNvPr id="2" name="Title 1">
+            <a:extLst>
+              <a:ext uri="{FF2B5EF4-FFF2-40B4-BE49-F238E27FC236}">
+                <a16:creationId xmlns:a16="http://schemas.microsoft.com/office/drawing/2014/main" id="{B16400DA-CDDF-4FD6-8EF4-02925A48C7A9}"/>
+              </a:ext>
+            </a:extLst>
+          </p:cNvPr>
+          <p:cNvSpPr>
+            <a:spLocks noGrp="1"/>
+          </p:cNvSpPr>
+          <p:nvPr>
+            <p:ph type="title"/>
+          </p:nvPr>
+        </p:nvSpPr>
+        <p:spPr/>
+        <p:txBody>
+          <a:bodyPr/>
+          <a:lstStyle/>
+          <a:p>
+            <a:r>
+              <a:rPr lang="en-US" dirty="0"/>
+              <a:t>Challenge 3</a:t>
+            </a:r>
+          </a:p>
+        </p:txBody>
+      </p:sp>
+      <p:sp>
+        <p:nvSpPr>
+          <p:cNvPr id="3" name="Content Placeholder 2">
+            <a:extLst>
+              <a:ext uri="{FF2B5EF4-FFF2-40B4-BE49-F238E27FC236}">
+                <a16:creationId xmlns:a16="http://schemas.microsoft.com/office/drawing/2014/main" id="{E838A4F2-F461-4798-8D0F-D40E3E00E65F}"/>
+              </a:ext>
+            </a:extLst>
+          </p:cNvPr>
+          <p:cNvSpPr>
+            <a:spLocks noGrp="1"/>
+          </p:cNvSpPr>
+          <p:nvPr>
+            <p:ph idx="1"/>
+          </p:nvPr>
+        </p:nvSpPr>
+        <p:spPr>
+          <a:xfrm>
+            <a:off x="1141412" y="2249487"/>
+            <a:ext cx="9905999" cy="4176480"/>
+          </a:xfrm>
+        </p:spPr>
+        <p:txBody>
+          <a:bodyPr>
+            <a:normAutofit/>
+          </a:bodyPr>
+          <a:lstStyle/>
+          <a:p>
+            <a:r>
+              <a:rPr lang="en-US" dirty="0"/>
+              <a:t>Prove (p v q) -&gt; (q-&gt;q) is a tautology (meaning it is equivalent to T)</a:t>
+            </a:r>
+          </a:p>
+          <a:p>
+            <a:r>
+              <a:rPr lang="en-US" dirty="0"/>
+              <a:t>(p v q)’ v (q’ v q)	IMPLICATION x 2</a:t>
+            </a:r>
+          </a:p>
+          <a:p>
+            <a:r>
+              <a:rPr lang="en-US" dirty="0"/>
+              <a:t>(p v q)’ v T		</a:t>
+            </a:r>
+          </a:p>
+          <a:p>
+            <a:r>
+              <a:rPr lang="en-US" dirty="0"/>
+              <a:t>T		</a:t>
+            </a:r>
+            <a:r>
+              <a:rPr lang="en-US"/>
+              <a:t>	DOMINATION</a:t>
+            </a:r>
+            <a:endParaRPr lang="en-US" dirty="0"/>
+          </a:p>
+          <a:p>
+            <a:endParaRPr lang="en-US" dirty="0"/>
+          </a:p>
+        </p:txBody>
+      </p:sp>
+    </p:spTree>
+    <p:extLst>
+      <p:ext uri="{BB962C8B-B14F-4D97-AF65-F5344CB8AC3E}">
+        <p14:creationId xmlns:p14="http://schemas.microsoft.com/office/powerpoint/2010/main" val="2891152683"/>
+      </p:ext>
+    </p:extLst>
+  </p:cSld>
+  <p:clrMapOvr>
+    <a:masterClrMapping/>
+  </p:clrMapOvr>
 </p:sld>
 </file>
 

</xml_diff>

<commit_message>
updated roll and grades
</commit_message>
<xml_diff>
--- a/Lectures/Lecture 3 - 20170906 Logic Laws.pptx
+++ b/Lectures/Lecture 3 - 20170906 Logic Laws.pptx
@@ -186,7 +186,7 @@
           <a:noFill/>
           <a:extLst>
             <a:ext uri="{909E8E84-426E-40dd-AFC4-6F175D3DCCD1}">
-              <a14:hiddenFill xmlns:a14="http://schemas.microsoft.com/office/drawing/2010/main" xmlns="">
+              <a14:hiddenFill xmlns="" xmlns:a14="http://schemas.microsoft.com/office/drawing/2010/main">
                 <a:solidFill>
                   <a:srgbClr val="FFFFFF"/>
                 </a:solidFill>
@@ -245,7 +245,7 @@
             </a:ln>
             <a:extLst>
               <a:ext uri="{91240B29-F687-4f45-9708-019B960494DF}">
-                <a14:hiddenLine xmlns:a14="http://schemas.microsoft.com/office/drawing/2010/main" xmlns="" w="9525">
+                <a14:hiddenLine xmlns="" xmlns:a14="http://schemas.microsoft.com/office/drawing/2010/main" w="9525">
                   <a:solidFill>
                     <a:srgbClr val="000000"/>
                   </a:solidFill>
@@ -335,7 +335,7 @@
             </a:ln>
             <a:extLst>
               <a:ext uri="{91240B29-F687-4f45-9708-019B960494DF}">
-                <a14:hiddenLine xmlns:a14="http://schemas.microsoft.com/office/drawing/2010/main" xmlns="" w="9525">
+                <a14:hiddenLine xmlns="" xmlns:a14="http://schemas.microsoft.com/office/drawing/2010/main" w="9525">
                   <a:solidFill>
                     <a:srgbClr val="000000"/>
                   </a:solidFill>
@@ -425,7 +425,7 @@
             </a:ln>
             <a:extLst>
               <a:ext uri="{91240B29-F687-4f45-9708-019B960494DF}">
-                <a14:hiddenLine xmlns:a14="http://schemas.microsoft.com/office/drawing/2010/main" xmlns="" w="9525">
+                <a14:hiddenLine xmlns="" xmlns:a14="http://schemas.microsoft.com/office/drawing/2010/main" w="9525">
                   <a:solidFill>
                     <a:srgbClr val="000000"/>
                   </a:solidFill>
@@ -459,7 +459,7 @@
             </a:ln>
             <a:extLst>
               <a:ext uri="{91240B29-F687-4f45-9708-019B960494DF}">
-                <a14:hiddenLine xmlns:a14="http://schemas.microsoft.com/office/drawing/2010/main" xmlns="" w="9525">
+                <a14:hiddenLine xmlns="" xmlns:a14="http://schemas.microsoft.com/office/drawing/2010/main" w="9525">
                   <a:solidFill>
                     <a:srgbClr val="000000"/>
                   </a:solidFill>
@@ -549,7 +549,7 @@
             </a:ln>
             <a:extLst>
               <a:ext uri="{91240B29-F687-4f45-9708-019B960494DF}">
-                <a14:hiddenLine xmlns:a14="http://schemas.microsoft.com/office/drawing/2010/main" xmlns="" w="9525">
+                <a14:hiddenLine xmlns="" xmlns:a14="http://schemas.microsoft.com/office/drawing/2010/main" w="9525">
                   <a:solidFill>
                     <a:srgbClr val="000000"/>
                   </a:solidFill>
@@ -611,7 +611,7 @@
             </a:ln>
             <a:extLst>
               <a:ext uri="{91240B29-F687-4f45-9708-019B960494DF}">
-                <a14:hiddenLine xmlns:a14="http://schemas.microsoft.com/office/drawing/2010/main" xmlns="" w="9525">
+                <a14:hiddenLine xmlns="" xmlns:a14="http://schemas.microsoft.com/office/drawing/2010/main" w="9525">
                   <a:solidFill>
                     <a:srgbClr val="000000"/>
                   </a:solidFill>
@@ -673,7 +673,7 @@
             </a:ln>
             <a:extLst>
               <a:ext uri="{91240B29-F687-4f45-9708-019B960494DF}">
-                <a14:hiddenLine xmlns:a14="http://schemas.microsoft.com/office/drawing/2010/main" xmlns="" w="9525">
+                <a14:hiddenLine xmlns="" xmlns:a14="http://schemas.microsoft.com/office/drawing/2010/main" w="9525">
                   <a:solidFill>
                     <a:srgbClr val="000000"/>
                   </a:solidFill>
@@ -763,7 +763,7 @@
             </a:ln>
             <a:extLst>
               <a:ext uri="{91240B29-F687-4f45-9708-019B960494DF}">
-                <a14:hiddenLine xmlns:a14="http://schemas.microsoft.com/office/drawing/2010/main" xmlns="" w="9525">
+                <a14:hiddenLine xmlns="" xmlns:a14="http://schemas.microsoft.com/office/drawing/2010/main" w="9525">
                   <a:solidFill>
                     <a:srgbClr val="000000"/>
                   </a:solidFill>
@@ -825,7 +825,7 @@
             </a:ln>
             <a:extLst>
               <a:ext uri="{91240B29-F687-4f45-9708-019B960494DF}">
-                <a14:hiddenLine xmlns:a14="http://schemas.microsoft.com/office/drawing/2010/main" xmlns="" w="9525">
+                <a14:hiddenLine xmlns="" xmlns:a14="http://schemas.microsoft.com/office/drawing/2010/main" w="9525">
                   <a:solidFill>
                     <a:srgbClr val="000000"/>
                   </a:solidFill>
@@ -887,7 +887,7 @@
             </a:ln>
             <a:extLst>
               <a:ext uri="{91240B29-F687-4f45-9708-019B960494DF}">
-                <a14:hiddenLine xmlns:a14="http://schemas.microsoft.com/office/drawing/2010/main" xmlns="" w="9525">
+                <a14:hiddenLine xmlns="" xmlns:a14="http://schemas.microsoft.com/office/drawing/2010/main" w="9525">
                   <a:solidFill>
                     <a:srgbClr val="000000"/>
                   </a:solidFill>
@@ -977,7 +977,7 @@
             </a:ln>
             <a:extLst>
               <a:ext uri="{91240B29-F687-4f45-9708-019B960494DF}">
-                <a14:hiddenLine xmlns:a14="http://schemas.microsoft.com/office/drawing/2010/main" xmlns="" w="9525">
+                <a14:hiddenLine xmlns="" xmlns:a14="http://schemas.microsoft.com/office/drawing/2010/main" w="9525">
                   <a:solidFill>
                     <a:srgbClr val="000000"/>
                   </a:solidFill>
@@ -1067,7 +1067,7 @@
             </a:ln>
             <a:extLst>
               <a:ext uri="{91240B29-F687-4f45-9708-019B960494DF}">
-                <a14:hiddenLine xmlns:a14="http://schemas.microsoft.com/office/drawing/2010/main" xmlns="" w="9525">
+                <a14:hiddenLine xmlns="" xmlns:a14="http://schemas.microsoft.com/office/drawing/2010/main" w="9525">
                   <a:solidFill>
                     <a:srgbClr val="000000"/>
                   </a:solidFill>
@@ -1129,7 +1129,7 @@
             </a:ln>
             <a:extLst>
               <a:ext uri="{91240B29-F687-4f45-9708-019B960494DF}">
-                <a14:hiddenLine xmlns:a14="http://schemas.microsoft.com/office/drawing/2010/main" xmlns="" w="9525">
+                <a14:hiddenLine xmlns="" xmlns:a14="http://schemas.microsoft.com/office/drawing/2010/main" w="9525">
                   <a:solidFill>
                     <a:srgbClr val="000000"/>
                   </a:solidFill>
@@ -1239,7 +1239,7 @@
             </a:ln>
             <a:extLst>
               <a:ext uri="{91240B29-F687-4f45-9708-019B960494DF}">
-                <a14:hiddenLine xmlns:a14="http://schemas.microsoft.com/office/drawing/2010/main" xmlns="" w="9525">
+                <a14:hiddenLine xmlns="" xmlns:a14="http://schemas.microsoft.com/office/drawing/2010/main" w="9525">
                   <a:solidFill>
                     <a:srgbClr val="000000"/>
                   </a:solidFill>
@@ -1301,7 +1301,7 @@
             </a:ln>
             <a:extLst>
               <a:ext uri="{91240B29-F687-4f45-9708-019B960494DF}">
-                <a14:hiddenLine xmlns:a14="http://schemas.microsoft.com/office/drawing/2010/main" xmlns="" w="9525">
+                <a14:hiddenLine xmlns="" xmlns:a14="http://schemas.microsoft.com/office/drawing/2010/main" w="9525">
                   <a:solidFill>
                     <a:srgbClr val="000000"/>
                   </a:solidFill>
@@ -1391,7 +1391,7 @@
             </a:ln>
             <a:extLst>
               <a:ext uri="{91240B29-F687-4f45-9708-019B960494DF}">
-                <a14:hiddenLine xmlns:a14="http://schemas.microsoft.com/office/drawing/2010/main" xmlns="" w="9525">
+                <a14:hiddenLine xmlns="" xmlns:a14="http://schemas.microsoft.com/office/drawing/2010/main" w="9525">
                   <a:solidFill>
                     <a:srgbClr val="000000"/>
                   </a:solidFill>
@@ -1481,7 +1481,7 @@
             </a:ln>
             <a:extLst>
               <a:ext uri="{91240B29-F687-4f45-9708-019B960494DF}">
-                <a14:hiddenLine xmlns:a14="http://schemas.microsoft.com/office/drawing/2010/main" xmlns="" w="9525">
+                <a14:hiddenLine xmlns="" xmlns:a14="http://schemas.microsoft.com/office/drawing/2010/main" w="9525">
                   <a:solidFill>
                     <a:srgbClr val="000000"/>
                   </a:solidFill>
@@ -1543,7 +1543,7 @@
             </a:ln>
             <a:extLst>
               <a:ext uri="{91240B29-F687-4f45-9708-019B960494DF}">
-                <a14:hiddenLine xmlns:a14="http://schemas.microsoft.com/office/drawing/2010/main" xmlns="" w="9525">
+                <a14:hiddenLine xmlns="" xmlns:a14="http://schemas.microsoft.com/office/drawing/2010/main" w="9525">
                   <a:solidFill>
                     <a:srgbClr val="000000"/>
                   </a:solidFill>
@@ -1633,7 +1633,7 @@
             </a:ln>
             <a:extLst>
               <a:ext uri="{91240B29-F687-4f45-9708-019B960494DF}">
-                <a14:hiddenLine xmlns:a14="http://schemas.microsoft.com/office/drawing/2010/main" xmlns="" w="9525">
+                <a14:hiddenLine xmlns="" xmlns:a14="http://schemas.microsoft.com/office/drawing/2010/main" w="9525">
                   <a:solidFill>
                     <a:srgbClr val="000000"/>
                   </a:solidFill>
@@ -1723,7 +1723,7 @@
             </a:ln>
             <a:extLst>
               <a:ext uri="{91240B29-F687-4f45-9708-019B960494DF}">
-                <a14:hiddenLine xmlns:a14="http://schemas.microsoft.com/office/drawing/2010/main" xmlns="" w="9525">
+                <a14:hiddenLine xmlns="" xmlns:a14="http://schemas.microsoft.com/office/drawing/2010/main" w="9525">
                   <a:solidFill>
                     <a:srgbClr val="000000"/>
                   </a:solidFill>
@@ -1779,7 +1779,7 @@
             </a:ln>
             <a:extLst>
               <a:ext uri="{91240B29-F687-4f45-9708-019B960494DF}">
-                <a14:hiddenLine xmlns:a14="http://schemas.microsoft.com/office/drawing/2010/main" xmlns="" w="9525">
+                <a14:hiddenLine xmlns="" xmlns:a14="http://schemas.microsoft.com/office/drawing/2010/main" w="9525">
                   <a:solidFill>
                     <a:srgbClr val="000000"/>
                   </a:solidFill>
@@ -1869,7 +1869,7 @@
             </a:ln>
             <a:extLst>
               <a:ext uri="{91240B29-F687-4f45-9708-019B960494DF}">
-                <a14:hiddenLine xmlns:a14="http://schemas.microsoft.com/office/drawing/2010/main" xmlns="" w="9525">
+                <a14:hiddenLine xmlns="" xmlns:a14="http://schemas.microsoft.com/office/drawing/2010/main" w="9525">
                   <a:solidFill>
                     <a:srgbClr val="000000"/>
                   </a:solidFill>
@@ -1925,7 +1925,7 @@
             </a:ln>
             <a:extLst>
               <a:ext uri="{91240B29-F687-4f45-9708-019B960494DF}">
-                <a14:hiddenLine xmlns:a14="http://schemas.microsoft.com/office/drawing/2010/main" xmlns="" w="9525">
+                <a14:hiddenLine xmlns="" xmlns:a14="http://schemas.microsoft.com/office/drawing/2010/main" w="9525">
                   <a:solidFill>
                     <a:srgbClr val="000000"/>
                   </a:solidFill>
@@ -2015,7 +2015,7 @@
             </a:ln>
             <a:extLst>
               <a:ext uri="{91240B29-F687-4f45-9708-019B960494DF}">
-                <a14:hiddenLine xmlns:a14="http://schemas.microsoft.com/office/drawing/2010/main" xmlns="" w="9525">
+                <a14:hiddenLine xmlns="" xmlns:a14="http://schemas.microsoft.com/office/drawing/2010/main" w="9525">
                   <a:solidFill>
                     <a:srgbClr val="000000"/>
                   </a:solidFill>
@@ -2083,7 +2083,7 @@
             </a:ln>
             <a:extLst>
               <a:ext uri="{91240B29-F687-4f45-9708-019B960494DF}">
-                <a14:hiddenLine xmlns:a14="http://schemas.microsoft.com/office/drawing/2010/main" xmlns="" w="9525">
+                <a14:hiddenLine xmlns="" xmlns:a14="http://schemas.microsoft.com/office/drawing/2010/main" w="9525">
                   <a:solidFill>
                     <a:srgbClr val="000000"/>
                   </a:solidFill>
@@ -2173,7 +2173,7 @@
             </a:ln>
             <a:extLst>
               <a:ext uri="{91240B29-F687-4f45-9708-019B960494DF}">
-                <a14:hiddenLine xmlns:a14="http://schemas.microsoft.com/office/drawing/2010/main" xmlns="" w="9525">
+                <a14:hiddenLine xmlns="" xmlns:a14="http://schemas.microsoft.com/office/drawing/2010/main" w="9525">
                   <a:solidFill>
                     <a:srgbClr val="000000"/>
                   </a:solidFill>
@@ -2241,7 +2241,7 @@
             </a:ln>
             <a:extLst>
               <a:ext uri="{91240B29-F687-4f45-9708-019B960494DF}">
-                <a14:hiddenLine xmlns:a14="http://schemas.microsoft.com/office/drawing/2010/main" xmlns="" w="9525">
+                <a14:hiddenLine xmlns="" xmlns:a14="http://schemas.microsoft.com/office/drawing/2010/main" w="9525">
                   <a:solidFill>
                     <a:srgbClr val="000000"/>
                   </a:solidFill>
@@ -2331,7 +2331,7 @@
             </a:ln>
             <a:extLst>
               <a:ext uri="{91240B29-F687-4f45-9708-019B960494DF}">
-                <a14:hiddenLine xmlns:a14="http://schemas.microsoft.com/office/drawing/2010/main" xmlns="" w="9525">
+                <a14:hiddenLine xmlns="" xmlns:a14="http://schemas.microsoft.com/office/drawing/2010/main" w="9525">
                   <a:solidFill>
                     <a:srgbClr val="000000"/>
                   </a:solidFill>
@@ -2365,7 +2365,7 @@
             </a:ln>
             <a:extLst>
               <a:ext uri="{91240B29-F687-4f45-9708-019B960494DF}">
-                <a14:hiddenLine xmlns:a14="http://schemas.microsoft.com/office/drawing/2010/main" xmlns="" w="9525">
+                <a14:hiddenLine xmlns="" xmlns:a14="http://schemas.microsoft.com/office/drawing/2010/main" w="9525">
                   <a:solidFill>
                     <a:srgbClr val="000000"/>
                   </a:solidFill>
@@ -2455,7 +2455,7 @@
             </a:ln>
             <a:extLst>
               <a:ext uri="{91240B29-F687-4f45-9708-019B960494DF}">
-                <a14:hiddenLine xmlns:a14="http://schemas.microsoft.com/office/drawing/2010/main" xmlns="" w="9525">
+                <a14:hiddenLine xmlns="" xmlns:a14="http://schemas.microsoft.com/office/drawing/2010/main" w="9525">
                   <a:solidFill>
                     <a:srgbClr val="000000"/>
                   </a:solidFill>
@@ -2517,7 +2517,7 @@
             </a:ln>
             <a:extLst>
               <a:ext uri="{91240B29-F687-4f45-9708-019B960494DF}">
-                <a14:hiddenLine xmlns:a14="http://schemas.microsoft.com/office/drawing/2010/main" xmlns="" w="9525">
+                <a14:hiddenLine xmlns="" xmlns:a14="http://schemas.microsoft.com/office/drawing/2010/main" w="9525">
                   <a:solidFill>
                     <a:srgbClr val="000000"/>
                   </a:solidFill>
@@ -2579,7 +2579,7 @@
             </a:ln>
             <a:extLst>
               <a:ext uri="{91240B29-F687-4f45-9708-019B960494DF}">
-                <a14:hiddenLine xmlns:a14="http://schemas.microsoft.com/office/drawing/2010/main" xmlns="" w="9525">
+                <a14:hiddenLine xmlns="" xmlns:a14="http://schemas.microsoft.com/office/drawing/2010/main" w="9525">
                   <a:solidFill>
                     <a:srgbClr val="000000"/>
                   </a:solidFill>
@@ -2669,7 +2669,7 @@
             </a:ln>
             <a:extLst>
               <a:ext uri="{91240B29-F687-4f45-9708-019B960494DF}">
-                <a14:hiddenLine xmlns:a14="http://schemas.microsoft.com/office/drawing/2010/main" xmlns="" w="9525">
+                <a14:hiddenLine xmlns="" xmlns:a14="http://schemas.microsoft.com/office/drawing/2010/main" w="9525">
                   <a:solidFill>
                     <a:srgbClr val="000000"/>
                   </a:solidFill>
@@ -2737,7 +2737,7 @@
             </a:ln>
             <a:extLst>
               <a:ext uri="{91240B29-F687-4f45-9708-019B960494DF}">
-                <a14:hiddenLine xmlns:a14="http://schemas.microsoft.com/office/drawing/2010/main" xmlns="" w="9525">
+                <a14:hiddenLine xmlns="" xmlns:a14="http://schemas.microsoft.com/office/drawing/2010/main" w="9525">
                   <a:solidFill>
                     <a:srgbClr val="000000"/>
                   </a:solidFill>
@@ -2799,7 +2799,7 @@
             </a:ln>
             <a:extLst>
               <a:ext uri="{91240B29-F687-4f45-9708-019B960494DF}">
-                <a14:hiddenLine xmlns:a14="http://schemas.microsoft.com/office/drawing/2010/main" xmlns="" w="9525">
+                <a14:hiddenLine xmlns="" xmlns:a14="http://schemas.microsoft.com/office/drawing/2010/main" w="9525">
                   <a:solidFill>
                     <a:srgbClr val="000000"/>
                   </a:solidFill>
@@ -2889,7 +2889,7 @@
             </a:ln>
             <a:extLst>
               <a:ext uri="{91240B29-F687-4f45-9708-019B960494DF}">
-                <a14:hiddenLine xmlns:a14="http://schemas.microsoft.com/office/drawing/2010/main" xmlns="" w="9525">
+                <a14:hiddenLine xmlns="" xmlns:a14="http://schemas.microsoft.com/office/drawing/2010/main" w="9525">
                   <a:solidFill>
                     <a:srgbClr val="000000"/>
                   </a:solidFill>
@@ -2951,7 +2951,7 @@
             </a:ln>
             <a:extLst>
               <a:ext uri="{91240B29-F687-4f45-9708-019B960494DF}">
-                <a14:hiddenLine xmlns:a14="http://schemas.microsoft.com/office/drawing/2010/main" xmlns="" w="9525">
+                <a14:hiddenLine xmlns="" xmlns:a14="http://schemas.microsoft.com/office/drawing/2010/main" w="9525">
                   <a:solidFill>
                     <a:srgbClr val="000000"/>
                   </a:solidFill>
@@ -3041,7 +3041,7 @@
             </a:ln>
             <a:extLst>
               <a:ext uri="{91240B29-F687-4f45-9708-019B960494DF}">
-                <a14:hiddenLine xmlns:a14="http://schemas.microsoft.com/office/drawing/2010/main" xmlns="" w="9525">
+                <a14:hiddenLine xmlns="" xmlns:a14="http://schemas.microsoft.com/office/drawing/2010/main" w="9525">
                   <a:solidFill>
                     <a:srgbClr val="000000"/>
                   </a:solidFill>
@@ -3103,7 +3103,7 @@
             </a:ln>
             <a:extLst>
               <a:ext uri="{91240B29-F687-4f45-9708-019B960494DF}">
-                <a14:hiddenLine xmlns:a14="http://schemas.microsoft.com/office/drawing/2010/main" xmlns="" w="9525">
+                <a14:hiddenLine xmlns="" xmlns:a14="http://schemas.microsoft.com/office/drawing/2010/main" w="9525">
                   <a:solidFill>
                     <a:srgbClr val="000000"/>
                   </a:solidFill>
@@ -3193,7 +3193,7 @@
             </a:ln>
             <a:extLst>
               <a:ext uri="{91240B29-F687-4f45-9708-019B960494DF}">
-                <a14:hiddenLine xmlns:a14="http://schemas.microsoft.com/office/drawing/2010/main" xmlns="" w="9525">
+                <a14:hiddenLine xmlns="" xmlns:a14="http://schemas.microsoft.com/office/drawing/2010/main" w="9525">
                   <a:solidFill>
                     <a:srgbClr val="000000"/>
                   </a:solidFill>
@@ -3227,7 +3227,7 @@
             </a:ln>
             <a:extLst>
               <a:ext uri="{91240B29-F687-4f45-9708-019B960494DF}">
-                <a14:hiddenLine xmlns:a14="http://schemas.microsoft.com/office/drawing/2010/main" xmlns="" w="9525">
+                <a14:hiddenLine xmlns="" xmlns:a14="http://schemas.microsoft.com/office/drawing/2010/main" w="9525">
                   <a:solidFill>
                     <a:srgbClr val="000000"/>
                   </a:solidFill>
@@ -3292,7 +3292,7 @@
             </a:ln>
             <a:extLst>
               <a:ext uri="{91240B29-F687-4f45-9708-019B960494DF}">
-                <a14:hiddenLine xmlns:a14="http://schemas.microsoft.com/office/drawing/2010/main" xmlns="" w="9525">
+                <a14:hiddenLine xmlns="" xmlns:a14="http://schemas.microsoft.com/office/drawing/2010/main" w="9525">
                   <a:solidFill>
                     <a:srgbClr val="000000"/>
                   </a:solidFill>
@@ -3382,7 +3382,7 @@
             </a:ln>
             <a:extLst>
               <a:ext uri="{91240B29-F687-4f45-9708-019B960494DF}">
-                <a14:hiddenLine xmlns:a14="http://schemas.microsoft.com/office/drawing/2010/main" xmlns="" w="9525">
+                <a14:hiddenLine xmlns="" xmlns:a14="http://schemas.microsoft.com/office/drawing/2010/main" w="9525">
                   <a:solidFill>
                     <a:srgbClr val="000000"/>
                   </a:solidFill>
@@ -3444,7 +3444,7 @@
             </a:ln>
             <a:extLst>
               <a:ext uri="{91240B29-F687-4f45-9708-019B960494DF}">
-                <a14:hiddenLine xmlns:a14="http://schemas.microsoft.com/office/drawing/2010/main" xmlns="" w="9525">
+                <a14:hiddenLine xmlns="" xmlns:a14="http://schemas.microsoft.com/office/drawing/2010/main" w="9525">
                   <a:solidFill>
                     <a:srgbClr val="000000"/>
                   </a:solidFill>
@@ -3534,7 +3534,7 @@
             </a:ln>
             <a:extLst>
               <a:ext uri="{91240B29-F687-4f45-9708-019B960494DF}">
-                <a14:hiddenLine xmlns:a14="http://schemas.microsoft.com/office/drawing/2010/main" xmlns="" w="9525">
+                <a14:hiddenLine xmlns="" xmlns:a14="http://schemas.microsoft.com/office/drawing/2010/main" w="9525">
                   <a:solidFill>
                     <a:srgbClr val="000000"/>
                   </a:solidFill>
@@ -3624,7 +3624,7 @@
             </a:ln>
             <a:extLst>
               <a:ext uri="{91240B29-F687-4f45-9708-019B960494DF}">
-                <a14:hiddenLine xmlns:a14="http://schemas.microsoft.com/office/drawing/2010/main" xmlns="" w="9525">
+                <a14:hiddenLine xmlns="" xmlns:a14="http://schemas.microsoft.com/office/drawing/2010/main" w="9525">
                   <a:solidFill>
                     <a:srgbClr val="000000"/>
                   </a:solidFill>
@@ -3689,7 +3689,7 @@
             </a:ln>
             <a:extLst>
               <a:ext uri="{91240B29-F687-4f45-9708-019B960494DF}">
-                <a14:hiddenLine xmlns:a14="http://schemas.microsoft.com/office/drawing/2010/main" xmlns="" w="9525">
+                <a14:hiddenLine xmlns="" xmlns:a14="http://schemas.microsoft.com/office/drawing/2010/main" w="9525">
                   <a:solidFill>
                     <a:srgbClr val="000000"/>
                   </a:solidFill>
@@ -3751,7 +3751,7 @@
             </a:ln>
             <a:extLst>
               <a:ext uri="{91240B29-F687-4f45-9708-019B960494DF}">
-                <a14:hiddenLine xmlns:a14="http://schemas.microsoft.com/office/drawing/2010/main" xmlns="" w="9525">
+                <a14:hiddenLine xmlns="" xmlns:a14="http://schemas.microsoft.com/office/drawing/2010/main" w="9525">
                   <a:solidFill>
                     <a:srgbClr val="000000"/>
                   </a:solidFill>
@@ -3841,7 +3841,7 @@
             </a:ln>
             <a:extLst>
               <a:ext uri="{91240B29-F687-4f45-9708-019B960494DF}">
-                <a14:hiddenLine xmlns:a14="http://schemas.microsoft.com/office/drawing/2010/main" xmlns="" w="9525">
+                <a14:hiddenLine xmlns="" xmlns:a14="http://schemas.microsoft.com/office/drawing/2010/main" w="9525">
                   <a:solidFill>
                     <a:srgbClr val="000000"/>
                   </a:solidFill>
@@ -3931,7 +3931,7 @@
             </a:ln>
             <a:extLst>
               <a:ext uri="{91240B29-F687-4f45-9708-019B960494DF}">
-                <a14:hiddenLine xmlns:a14="http://schemas.microsoft.com/office/drawing/2010/main" xmlns="" w="9525">
+                <a14:hiddenLine xmlns="" xmlns:a14="http://schemas.microsoft.com/office/drawing/2010/main" w="9525">
                   <a:solidFill>
                     <a:srgbClr val="000000"/>
                   </a:solidFill>
@@ -3993,7 +3993,7 @@
             </a:ln>
             <a:extLst>
               <a:ext uri="{91240B29-F687-4f45-9708-019B960494DF}">
-                <a14:hiddenLine xmlns:a14="http://schemas.microsoft.com/office/drawing/2010/main" xmlns="" w="9525">
+                <a14:hiddenLine xmlns="" xmlns:a14="http://schemas.microsoft.com/office/drawing/2010/main" w="9525">
                   <a:solidFill>
                     <a:srgbClr val="000000"/>
                   </a:solidFill>
@@ -4113,7 +4113,7 @@
             </a:ln>
             <a:extLst>
               <a:ext uri="{91240B29-F687-4f45-9708-019B960494DF}">
-                <a14:hiddenLine xmlns:a14="http://schemas.microsoft.com/office/drawing/2010/main" xmlns="" w="9525">
+                <a14:hiddenLine xmlns="" xmlns:a14="http://schemas.microsoft.com/office/drawing/2010/main" w="9525">
                   <a:solidFill>
                     <a:srgbClr val="000000"/>
                   </a:solidFill>
@@ -4181,7 +4181,7 @@
             </a:ln>
             <a:extLst>
               <a:ext uri="{91240B29-F687-4f45-9708-019B960494DF}">
-                <a14:hiddenLine xmlns:a14="http://schemas.microsoft.com/office/drawing/2010/main" xmlns="" w="9525">
+                <a14:hiddenLine xmlns="" xmlns:a14="http://schemas.microsoft.com/office/drawing/2010/main" w="9525">
                   <a:solidFill>
                     <a:srgbClr val="000000"/>
                   </a:solidFill>
@@ -4271,7 +4271,7 @@
             </a:ln>
             <a:extLst>
               <a:ext uri="{91240B29-F687-4f45-9708-019B960494DF}">
-                <a14:hiddenLine xmlns:a14="http://schemas.microsoft.com/office/drawing/2010/main" xmlns="" w="9525">
+                <a14:hiddenLine xmlns="" xmlns:a14="http://schemas.microsoft.com/office/drawing/2010/main" w="9525">
                   <a:solidFill>
                     <a:srgbClr val="000000"/>
                   </a:solidFill>
@@ -9000,7 +9000,7 @@
           <a:noFill/>
           <a:extLst>
             <a:ext uri="{909E8E84-426E-40dd-AFC4-6F175D3DCCD1}">
-              <a14:hiddenFill xmlns:a14="http://schemas.microsoft.com/office/drawing/2010/main" xmlns="">
+              <a14:hiddenFill xmlns="" xmlns:a14="http://schemas.microsoft.com/office/drawing/2010/main">
                 <a:solidFill>
                   <a:srgbClr val="FFFFFF"/>
                 </a:solidFill>
@@ -9074,7 +9074,7 @@
               </a:ln>
               <a:extLst>
                 <a:ext uri="{91240B29-F687-4f45-9708-019B960494DF}">
-                  <a14:hiddenLine xmlns:a14="http://schemas.microsoft.com/office/drawing/2010/main" xmlns="" w="9525">
+                  <a14:hiddenLine xmlns="" xmlns:a14="http://schemas.microsoft.com/office/drawing/2010/main" w="9525">
                     <a:solidFill>
                       <a:srgbClr val="000000"/>
                     </a:solidFill>
@@ -9164,7 +9164,7 @@
               </a:ln>
               <a:extLst>
                 <a:ext uri="{91240B29-F687-4f45-9708-019B960494DF}">
-                  <a14:hiddenLine xmlns:a14="http://schemas.microsoft.com/office/drawing/2010/main" xmlns="" w="9525">
+                  <a14:hiddenLine xmlns="" xmlns:a14="http://schemas.microsoft.com/office/drawing/2010/main" w="9525">
                     <a:solidFill>
                       <a:srgbClr val="000000"/>
                     </a:solidFill>
@@ -9254,7 +9254,7 @@
               </a:ln>
               <a:extLst>
                 <a:ext uri="{91240B29-F687-4f45-9708-019B960494DF}">
-                  <a14:hiddenLine xmlns:a14="http://schemas.microsoft.com/office/drawing/2010/main" xmlns="" w="9525">
+                  <a14:hiddenLine xmlns="" xmlns:a14="http://schemas.microsoft.com/office/drawing/2010/main" w="9525">
                     <a:solidFill>
                       <a:srgbClr val="000000"/>
                     </a:solidFill>
@@ -9316,7 +9316,7 @@
               </a:ln>
               <a:extLst>
                 <a:ext uri="{91240B29-F687-4f45-9708-019B960494DF}">
-                  <a14:hiddenLine xmlns:a14="http://schemas.microsoft.com/office/drawing/2010/main" xmlns="" w="9525">
+                  <a14:hiddenLine xmlns="" xmlns:a14="http://schemas.microsoft.com/office/drawing/2010/main" w="9525">
                     <a:solidFill>
                       <a:srgbClr val="000000"/>
                     </a:solidFill>
@@ -9406,7 +9406,7 @@
               </a:ln>
               <a:extLst>
                 <a:ext uri="{91240B29-F687-4f45-9708-019B960494DF}">
-                  <a14:hiddenLine xmlns:a14="http://schemas.microsoft.com/office/drawing/2010/main" xmlns="" w="9525">
+                  <a14:hiddenLine xmlns="" xmlns:a14="http://schemas.microsoft.com/office/drawing/2010/main" w="9525">
                     <a:solidFill>
                       <a:srgbClr val="000000"/>
                     </a:solidFill>
@@ -9468,7 +9468,7 @@
               </a:ln>
               <a:extLst>
                 <a:ext uri="{91240B29-F687-4f45-9708-019B960494DF}">
-                  <a14:hiddenLine xmlns:a14="http://schemas.microsoft.com/office/drawing/2010/main" xmlns="" w="9525">
+                  <a14:hiddenLine xmlns="" xmlns:a14="http://schemas.microsoft.com/office/drawing/2010/main" w="9525">
                     <a:solidFill>
                       <a:srgbClr val="000000"/>
                     </a:solidFill>
@@ -9530,7 +9530,7 @@
               </a:ln>
               <a:extLst>
                 <a:ext uri="{91240B29-F687-4f45-9708-019B960494DF}">
-                  <a14:hiddenLine xmlns:a14="http://schemas.microsoft.com/office/drawing/2010/main" xmlns="" w="9525">
+                  <a14:hiddenLine xmlns="" xmlns:a14="http://schemas.microsoft.com/office/drawing/2010/main" w="9525">
                     <a:solidFill>
                       <a:srgbClr val="000000"/>
                     </a:solidFill>
@@ -9620,7 +9620,7 @@
               </a:ln>
               <a:extLst>
                 <a:ext uri="{91240B29-F687-4f45-9708-019B960494DF}">
-                  <a14:hiddenLine xmlns:a14="http://schemas.microsoft.com/office/drawing/2010/main" xmlns="" w="9525">
+                  <a14:hiddenLine xmlns="" xmlns:a14="http://schemas.microsoft.com/office/drawing/2010/main" w="9525">
                     <a:solidFill>
                       <a:srgbClr val="000000"/>
                     </a:solidFill>
@@ -9710,7 +9710,7 @@
               </a:ln>
               <a:extLst>
                 <a:ext uri="{91240B29-F687-4f45-9708-019B960494DF}">
-                  <a14:hiddenLine xmlns:a14="http://schemas.microsoft.com/office/drawing/2010/main" xmlns="" w="9525">
+                  <a14:hiddenLine xmlns="" xmlns:a14="http://schemas.microsoft.com/office/drawing/2010/main" w="9525">
                     <a:solidFill>
                       <a:srgbClr val="000000"/>
                     </a:solidFill>
@@ -9772,7 +9772,7 @@
               </a:ln>
               <a:extLst>
                 <a:ext uri="{91240B29-F687-4f45-9708-019B960494DF}">
-                  <a14:hiddenLine xmlns:a14="http://schemas.microsoft.com/office/drawing/2010/main" xmlns="" w="9525">
+                  <a14:hiddenLine xmlns="" xmlns:a14="http://schemas.microsoft.com/office/drawing/2010/main" w="9525">
                     <a:solidFill>
                       <a:srgbClr val="000000"/>
                     </a:solidFill>
@@ -9882,7 +9882,7 @@
               </a:ln>
               <a:extLst>
                 <a:ext uri="{91240B29-F687-4f45-9708-019B960494DF}">
-                  <a14:hiddenLine xmlns:a14="http://schemas.microsoft.com/office/drawing/2010/main" xmlns="" w="9525">
+                  <a14:hiddenLine xmlns="" xmlns:a14="http://schemas.microsoft.com/office/drawing/2010/main" w="9525">
                     <a:solidFill>
                       <a:srgbClr val="000000"/>
                     </a:solidFill>
@@ -9966,7 +9966,7 @@
               </a:ln>
               <a:extLst>
                 <a:ext uri="{91240B29-F687-4f45-9708-019B960494DF}">
-                  <a14:hiddenLine xmlns:a14="http://schemas.microsoft.com/office/drawing/2010/main" xmlns="" w="9525">
+                  <a14:hiddenLine xmlns="" xmlns:a14="http://schemas.microsoft.com/office/drawing/2010/main" w="9525">
                     <a:solidFill>
                       <a:srgbClr val="000000"/>
                     </a:solidFill>
@@ -10028,7 +10028,7 @@
               </a:ln>
               <a:extLst>
                 <a:ext uri="{91240B29-F687-4f45-9708-019B960494DF}">
-                  <a14:hiddenLine xmlns:a14="http://schemas.microsoft.com/office/drawing/2010/main" xmlns="" w="9525">
+                  <a14:hiddenLine xmlns="" xmlns:a14="http://schemas.microsoft.com/office/drawing/2010/main" w="9525">
                     <a:solidFill>
                       <a:srgbClr val="000000"/>
                     </a:solidFill>
@@ -10090,7 +10090,7 @@
               </a:ln>
               <a:extLst>
                 <a:ext uri="{91240B29-F687-4f45-9708-019B960494DF}">
-                  <a14:hiddenLine xmlns:a14="http://schemas.microsoft.com/office/drawing/2010/main" xmlns="" w="9525">
+                  <a14:hiddenLine xmlns="" xmlns:a14="http://schemas.microsoft.com/office/drawing/2010/main" w="9525">
                     <a:solidFill>
                       <a:srgbClr val="000000"/>
                     </a:solidFill>
@@ -10180,7 +10180,7 @@
               </a:ln>
               <a:extLst>
                 <a:ext uri="{91240B29-F687-4f45-9708-019B960494DF}">
-                  <a14:hiddenLine xmlns:a14="http://schemas.microsoft.com/office/drawing/2010/main" xmlns="" w="9525">
+                  <a14:hiddenLine xmlns="" xmlns:a14="http://schemas.microsoft.com/office/drawing/2010/main" w="9525">
                     <a:solidFill>
                       <a:srgbClr val="000000"/>
                     </a:solidFill>
@@ -10214,7 +10214,7 @@
               </a:ln>
               <a:extLst>
                 <a:ext uri="{91240B29-F687-4f45-9708-019B960494DF}">
-                  <a14:hiddenLine xmlns:a14="http://schemas.microsoft.com/office/drawing/2010/main" xmlns="" w="9525">
+                  <a14:hiddenLine xmlns="" xmlns:a14="http://schemas.microsoft.com/office/drawing/2010/main" w="9525">
                     <a:solidFill>
                       <a:srgbClr val="000000"/>
                     </a:solidFill>
@@ -10279,7 +10279,7 @@
               </a:ln>
               <a:extLst>
                 <a:ext uri="{91240B29-F687-4f45-9708-019B960494DF}">
-                  <a14:hiddenLine xmlns:a14="http://schemas.microsoft.com/office/drawing/2010/main" xmlns="" w="9525">
+                  <a14:hiddenLine xmlns="" xmlns:a14="http://schemas.microsoft.com/office/drawing/2010/main" w="9525">
                     <a:solidFill>
                       <a:srgbClr val="000000"/>
                     </a:solidFill>
@@ -10369,7 +10369,7 @@
               </a:ln>
               <a:extLst>
                 <a:ext uri="{91240B29-F687-4f45-9708-019B960494DF}">
-                  <a14:hiddenLine xmlns:a14="http://schemas.microsoft.com/office/drawing/2010/main" xmlns="" w="9525">
+                  <a14:hiddenLine xmlns="" xmlns:a14="http://schemas.microsoft.com/office/drawing/2010/main" w="9525">
                     <a:solidFill>
                       <a:srgbClr val="000000"/>
                     </a:solidFill>
@@ -10431,7 +10431,7 @@
               </a:ln>
               <a:extLst>
                 <a:ext uri="{91240B29-F687-4f45-9708-019B960494DF}">
-                  <a14:hiddenLine xmlns:a14="http://schemas.microsoft.com/office/drawing/2010/main" xmlns="" w="9525">
+                  <a14:hiddenLine xmlns="" xmlns:a14="http://schemas.microsoft.com/office/drawing/2010/main" w="9525">
                     <a:solidFill>
                       <a:srgbClr val="000000"/>
                     </a:solidFill>
@@ -10521,7 +10521,7 @@
               </a:ln>
               <a:extLst>
                 <a:ext uri="{91240B29-F687-4f45-9708-019B960494DF}">
-                  <a14:hiddenLine xmlns:a14="http://schemas.microsoft.com/office/drawing/2010/main" xmlns="" w="9525">
+                  <a14:hiddenLine xmlns="" xmlns:a14="http://schemas.microsoft.com/office/drawing/2010/main" w="9525">
                     <a:solidFill>
                       <a:srgbClr val="000000"/>
                     </a:solidFill>
@@ -10586,7 +10586,7 @@
               </a:ln>
               <a:extLst>
                 <a:ext uri="{91240B29-F687-4f45-9708-019B960494DF}">
-                  <a14:hiddenLine xmlns:a14="http://schemas.microsoft.com/office/drawing/2010/main" xmlns="" w="9525">
+                  <a14:hiddenLine xmlns="" xmlns:a14="http://schemas.microsoft.com/office/drawing/2010/main" w="9525">
                     <a:solidFill>
                       <a:srgbClr val="000000"/>
                     </a:solidFill>
@@ -10648,7 +10648,7 @@
               </a:ln>
               <a:extLst>
                 <a:ext uri="{91240B29-F687-4f45-9708-019B960494DF}">
-                  <a14:hiddenLine xmlns:a14="http://schemas.microsoft.com/office/drawing/2010/main" xmlns="" w="9525">
+                  <a14:hiddenLine xmlns="" xmlns:a14="http://schemas.microsoft.com/office/drawing/2010/main" w="9525">
                     <a:solidFill>
                       <a:srgbClr val="000000"/>
                     </a:solidFill>
@@ -10738,7 +10738,7 @@
               </a:ln>
               <a:extLst>
                 <a:ext uri="{91240B29-F687-4f45-9708-019B960494DF}">
-                  <a14:hiddenLine xmlns:a14="http://schemas.microsoft.com/office/drawing/2010/main" xmlns="" w="9525">
+                  <a14:hiddenLine xmlns="" xmlns:a14="http://schemas.microsoft.com/office/drawing/2010/main" w="9525">
                     <a:solidFill>
                       <a:srgbClr val="000000"/>
                     </a:solidFill>
@@ -10828,7 +10828,7 @@
               </a:ln>
               <a:extLst>
                 <a:ext uri="{91240B29-F687-4f45-9708-019B960494DF}">
-                  <a14:hiddenLine xmlns:a14="http://schemas.microsoft.com/office/drawing/2010/main" xmlns="" w="9525">
+                  <a14:hiddenLine xmlns="" xmlns:a14="http://schemas.microsoft.com/office/drawing/2010/main" w="9525">
                     <a:solidFill>
                       <a:srgbClr val="000000"/>
                     </a:solidFill>
@@ -10893,7 +10893,7 @@
               </a:ln>
               <a:extLst>
                 <a:ext uri="{91240B29-F687-4f45-9708-019B960494DF}">
-                  <a14:hiddenLine xmlns:a14="http://schemas.microsoft.com/office/drawing/2010/main" xmlns="" w="9525">
+                  <a14:hiddenLine xmlns="" xmlns:a14="http://schemas.microsoft.com/office/drawing/2010/main" w="9525">
                     <a:solidFill>
                       <a:srgbClr val="000000"/>
                     </a:solidFill>
@@ -11013,7 +11013,7 @@
               </a:ln>
               <a:extLst>
                 <a:ext uri="{91240B29-F687-4f45-9708-019B960494DF}">
-                  <a14:hiddenLine xmlns:a14="http://schemas.microsoft.com/office/drawing/2010/main" xmlns="" w="9525">
+                  <a14:hiddenLine xmlns="" xmlns:a14="http://schemas.microsoft.com/office/drawing/2010/main" w="9525">
                     <a:solidFill>
                       <a:srgbClr val="000000"/>
                     </a:solidFill>
@@ -11094,7 +11094,7 @@
               </a:ln>
               <a:extLst>
                 <a:ext uri="{91240B29-F687-4f45-9708-019B960494DF}">
-                  <a14:hiddenLine xmlns:a14="http://schemas.microsoft.com/office/drawing/2010/main" xmlns="" w="9525">
+                  <a14:hiddenLine xmlns="" xmlns:a14="http://schemas.microsoft.com/office/drawing/2010/main" w="9525">
                     <a:solidFill>
                       <a:srgbClr val="000000"/>
                     </a:solidFill>
@@ -11209,7 +11209,7 @@
               </a:ln>
               <a:extLst>
                 <a:ext uri="{91240B29-F687-4f45-9708-019B960494DF}">
-                  <a14:hiddenLine xmlns:a14="http://schemas.microsoft.com/office/drawing/2010/main" xmlns="" w="9525">
+                  <a14:hiddenLine xmlns="" xmlns:a14="http://schemas.microsoft.com/office/drawing/2010/main" w="9525">
                     <a:solidFill>
                       <a:srgbClr val="000000"/>
                     </a:solidFill>
@@ -11299,7 +11299,7 @@
               </a:ln>
               <a:extLst>
                 <a:ext uri="{91240B29-F687-4f45-9708-019B960494DF}">
-                  <a14:hiddenLine xmlns:a14="http://schemas.microsoft.com/office/drawing/2010/main" xmlns="" w="9525">
+                  <a14:hiddenLine xmlns="" xmlns:a14="http://schemas.microsoft.com/office/drawing/2010/main" w="9525">
                     <a:solidFill>
                       <a:srgbClr val="000000"/>
                     </a:solidFill>
@@ -11364,7 +11364,7 @@
               </a:ln>
               <a:extLst>
                 <a:ext uri="{91240B29-F687-4f45-9708-019B960494DF}">
-                  <a14:hiddenLine xmlns:a14="http://schemas.microsoft.com/office/drawing/2010/main" xmlns="" w="9525">
+                  <a14:hiddenLine xmlns="" xmlns:a14="http://schemas.microsoft.com/office/drawing/2010/main" w="9525">
                     <a:solidFill>
                       <a:srgbClr val="000000"/>
                     </a:solidFill>
@@ -11454,7 +11454,7 @@
               </a:ln>
               <a:extLst>
                 <a:ext uri="{91240B29-F687-4f45-9708-019B960494DF}">
-                  <a14:hiddenLine xmlns:a14="http://schemas.microsoft.com/office/drawing/2010/main" xmlns="" w="9525">
+                  <a14:hiddenLine xmlns="" xmlns:a14="http://schemas.microsoft.com/office/drawing/2010/main" w="9525">
                     <a:solidFill>
                       <a:srgbClr val="000000"/>
                     </a:solidFill>
@@ -11522,7 +11522,7 @@
               </a:ln>
               <a:extLst>
                 <a:ext uri="{91240B29-F687-4f45-9708-019B960494DF}">
-                  <a14:hiddenLine xmlns:a14="http://schemas.microsoft.com/office/drawing/2010/main" xmlns="" w="9525">
+                  <a14:hiddenLine xmlns="" xmlns:a14="http://schemas.microsoft.com/office/drawing/2010/main" w="9525">
                     <a:solidFill>
                       <a:srgbClr val="000000"/>
                     </a:solidFill>
@@ -11612,7 +11612,7 @@
               </a:ln>
               <a:extLst>
                 <a:ext uri="{91240B29-F687-4f45-9708-019B960494DF}">
-                  <a14:hiddenLine xmlns:a14="http://schemas.microsoft.com/office/drawing/2010/main" xmlns="" w="9525">
+                  <a14:hiddenLine xmlns="" xmlns:a14="http://schemas.microsoft.com/office/drawing/2010/main" w="9525">
                     <a:solidFill>
                       <a:srgbClr val="000000"/>
                     </a:solidFill>
@@ -11680,7 +11680,7 @@
               </a:ln>
               <a:extLst>
                 <a:ext uri="{91240B29-F687-4f45-9708-019B960494DF}">
-                  <a14:hiddenLine xmlns:a14="http://schemas.microsoft.com/office/drawing/2010/main" xmlns="" w="9525">
+                  <a14:hiddenLine xmlns="" xmlns:a14="http://schemas.microsoft.com/office/drawing/2010/main" w="9525">
                     <a:solidFill>
                       <a:srgbClr val="000000"/>
                     </a:solidFill>
@@ -11770,7 +11770,7 @@
               </a:ln>
               <a:extLst>
                 <a:ext uri="{91240B29-F687-4f45-9708-019B960494DF}">
-                  <a14:hiddenLine xmlns:a14="http://schemas.microsoft.com/office/drawing/2010/main" xmlns="" w="9525">
+                  <a14:hiddenLine xmlns="" xmlns:a14="http://schemas.microsoft.com/office/drawing/2010/main" w="9525">
                     <a:solidFill>
                       <a:srgbClr val="000000"/>
                     </a:solidFill>
@@ -11804,7 +11804,7 @@
               </a:ln>
               <a:extLst>
                 <a:ext uri="{91240B29-F687-4f45-9708-019B960494DF}">
-                  <a14:hiddenLine xmlns:a14="http://schemas.microsoft.com/office/drawing/2010/main" xmlns="" w="9525">
+                  <a14:hiddenLine xmlns="" xmlns:a14="http://schemas.microsoft.com/office/drawing/2010/main" w="9525">
                     <a:solidFill>
                       <a:srgbClr val="000000"/>
                     </a:solidFill>
@@ -12427,6 +12427,13 @@
   <p:clrMapOvr>
     <a:masterClrMapping/>
   </p:clrMapOvr>
+  <p:timing>
+    <p:tnLst>
+      <p:par>
+        <p:cTn id="1" dur="indefinite" restart="never" nodeType="tmRoot"/>
+      </p:par>
+    </p:tnLst>
+  </p:timing>
 </p:sld>
 </file>
 
@@ -13469,7 +13476,19 @@
           <a:p>
             <a:r>
               <a:rPr lang="en-US" dirty="0"/>
-              <a:t>P ^ Q ^ R		</a:t>
+              <a:t>P ^ Q </a:t>
+            </a:r>
+            <a:r>
+              <a:rPr lang="en-US"/>
+              <a:t>^ </a:t>
+            </a:r>
+            <a:r>
+              <a:rPr lang="en-US" smtClean="0"/>
+              <a:t>R’</a:t>
+            </a:r>
+            <a:r>
+              <a:rPr lang="en-US" dirty="0"/>
+              <a:t>		</a:t>
             </a:r>
             <a:r>
               <a:rPr lang="en-US" dirty="0" err="1"/>
@@ -17345,7 +17364,19 @@
               <a:rPr lang="en-US" dirty="0">
                 <a:sym typeface="Wingdings" panose="05000000000000000000" pitchFamily="2" charset="2"/>
               </a:rPr>
-              <a:t>P v F  F (DOMINATION)</a:t>
+              <a:t>P </a:t>
+            </a:r>
+            <a:r>
+              <a:rPr lang="en-US" dirty="0" smtClean="0">
+                <a:sym typeface="Wingdings" panose="05000000000000000000" pitchFamily="2" charset="2"/>
+              </a:rPr>
+              <a:t>^ </a:t>
+            </a:r>
+            <a:r>
+              <a:rPr lang="en-US" dirty="0">
+                <a:sym typeface="Wingdings" panose="05000000000000000000" pitchFamily="2" charset="2"/>
+              </a:rPr>
+              <a:t>F  F (DOMINATION)</a:t>
             </a:r>
           </a:p>
           <a:p>

</xml_diff>